<commit_message>
- be the reaper and kill those deadly tomatoes, AepFXels and ApFXelsines
</commit_message>
<xml_diff>
--- a/JavaFX-UserGroup.pptx
+++ b/JavaFX-UserGroup.pptx
@@ -204,7 +204,7 @@
           <a:p>
             <a:fld id="{D6E4795D-47E8-774D-9ED5-0B5304BFB957}" type="datetimeFigureOut">
               <a:rPr lang="de-DE" smtClean="0"/>
-              <a:t>20.11.12</a:t>
+              <a:t>21.11.2012</a:t>
             </a:fld>
             <a:endParaRPr lang="de-DE"/>
           </a:p>
@@ -867,7 +867,7 @@
           <a:p>
             <a:fld id="{4251665B-C24A-4702-B522-6A4334602E03}" type="datetimeFigureOut">
               <a:rPr lang="en-US" smtClean="0"/>
-              <a:t>20.11.12</a:t>
+              <a:t>11/21/2012</a:t>
             </a:fld>
             <a:endParaRPr lang="en-US"/>
           </a:p>
@@ -1154,7 +1154,7 @@
           <a:p>
             <a:fld id="{4251665B-C24A-4702-B522-6A4334602E03}" type="datetimeFigureOut">
               <a:rPr lang="en-US" smtClean="0"/>
-              <a:t>20.11.12</a:t>
+              <a:t>11/21/2012</a:t>
             </a:fld>
             <a:endParaRPr lang="en-US"/>
           </a:p>
@@ -1489,7 +1489,7 @@
           <a:p>
             <a:fld id="{4251665B-C24A-4702-B522-6A4334602E03}" type="datetimeFigureOut">
               <a:rPr lang="en-US" smtClean="0"/>
-              <a:t>20.11.12</a:t>
+              <a:t>11/21/2012</a:t>
             </a:fld>
             <a:endParaRPr lang="en-US"/>
           </a:p>
@@ -1911,7 +1911,7 @@
           <a:p>
             <a:fld id="{4251665B-C24A-4702-B522-6A4334602E03}" type="datetimeFigureOut">
               <a:rPr lang="en-US" smtClean="0"/>
-              <a:t>20.11.12</a:t>
+              <a:t>11/21/2012</a:t>
             </a:fld>
             <a:endParaRPr lang="en-US"/>
           </a:p>
@@ -2328,7 +2328,7 @@
           <a:p>
             <a:fld id="{4251665B-C24A-4702-B522-6A4334602E03}" type="datetimeFigureOut">
               <a:rPr lang="en-US" smtClean="0"/>
-              <a:t>20.11.12</a:t>
+              <a:t>11/21/2012</a:t>
             </a:fld>
             <a:endParaRPr lang="en-US"/>
           </a:p>
@@ -2461,7 +2461,7 @@
           <a:p>
             <a:fld id="{4251665B-C24A-4702-B522-6A4334602E03}" type="datetimeFigureOut">
               <a:rPr lang="en-US" smtClean="0"/>
-              <a:t>20.11.12</a:t>
+              <a:t>11/21/2012</a:t>
             </a:fld>
             <a:endParaRPr lang="en-US"/>
           </a:p>
@@ -2783,7 +2783,7 @@
           <a:p>
             <a:fld id="{4251665B-C24A-4702-B522-6A4334602E03}" type="datetimeFigureOut">
               <a:rPr lang="en-US" smtClean="0"/>
-              <a:t>20.11.12</a:t>
+              <a:t>11/21/2012</a:t>
             </a:fld>
             <a:endParaRPr lang="en-US"/>
           </a:p>
@@ -3028,7 +3028,7 @@
           <a:p>
             <a:fld id="{4251665B-C24A-4702-B522-6A4334602E03}" type="datetimeFigureOut">
               <a:rPr lang="en-US" smtClean="0"/>
-              <a:t>20.11.12</a:t>
+              <a:t>11/21/2012</a:t>
             </a:fld>
             <a:endParaRPr lang="en-US"/>
           </a:p>
@@ -3366,7 +3366,7 @@
           <a:p>
             <a:fld id="{4251665B-C24A-4702-B522-6A4334602E03}" type="datetimeFigureOut">
               <a:rPr lang="en-US" smtClean="0"/>
-              <a:t>20.11.12</a:t>
+              <a:t>11/21/2012</a:t>
             </a:fld>
             <a:endParaRPr lang="en-US"/>
           </a:p>
@@ -3666,7 +3666,7 @@
           <a:p>
             <a:fld id="{4251665B-C24A-4702-B522-6A4334602E03}" type="datetimeFigureOut">
               <a:rPr lang="en-US" smtClean="0"/>
-              <a:t>20.11.12</a:t>
+              <a:t>11/21/2012</a:t>
             </a:fld>
             <a:endParaRPr lang="en-US"/>
           </a:p>
@@ -4073,7 +4073,7 @@
           <a:p>
             <a:fld id="{4251665B-C24A-4702-B522-6A4334602E03}" type="datetimeFigureOut">
               <a:rPr lang="en-US" smtClean="0"/>
-              <a:t>20.11.12</a:t>
+              <a:t>11/21/2012</a:t>
             </a:fld>
             <a:endParaRPr lang="en-US"/>
           </a:p>
@@ -4290,7 +4290,7 @@
           <a:p>
             <a:fld id="{4251665B-C24A-4702-B522-6A4334602E03}" type="datetimeFigureOut">
               <a:rPr lang="en-US" smtClean="0"/>
-              <a:t>20.11.12</a:t>
+              <a:t>11/21/2012</a:t>
             </a:fld>
             <a:endParaRPr lang="en-US"/>
           </a:p>
@@ -4347,7 +4347,7 @@
           <p:nvPr userDrawn="1"/>
         </p:nvPicPr>
         <p:blipFill>
-          <a:blip r:embed="rId2">
+          <a:blip r:embed="rId2" cstate="email">
             <a:alphaModFix amt="41000"/>
             <a:extLst>
               <a:ext uri="{28A0092B-C50C-407E-A947-70E740481C1C}">
@@ -4543,7 +4543,7 @@
           <a:p>
             <a:fld id="{4251665B-C24A-4702-B522-6A4334602E03}" type="datetimeFigureOut">
               <a:rPr lang="en-US" smtClean="0"/>
-              <a:t>20.11.12</a:t>
+              <a:t>11/21/2012</a:t>
             </a:fld>
             <a:endParaRPr lang="en-US"/>
           </a:p>
@@ -4769,7 +4769,7 @@
           <a:p>
             <a:fld id="{4251665B-C24A-4702-B522-6A4334602E03}" type="datetimeFigureOut">
               <a:rPr lang="en-US" smtClean="0"/>
-              <a:t>20.11.12</a:t>
+              <a:t>11/21/2012</a:t>
             </a:fld>
             <a:endParaRPr lang="en-US"/>
           </a:p>
@@ -4826,7 +4826,7 @@
           <p:nvPr userDrawn="1"/>
         </p:nvPicPr>
         <p:blipFill>
-          <a:blip r:embed="rId2">
+          <a:blip r:embed="rId2" cstate="email">
             <a:alphaModFix amt="41000"/>
             <a:extLst>
               <a:ext uri="{28A0092B-C50C-407E-A947-70E740481C1C}">
@@ -5139,7 +5139,7 @@
           <a:p>
             <a:fld id="{4251665B-C24A-4702-B522-6A4334602E03}" type="datetimeFigureOut">
               <a:rPr lang="en-US" smtClean="0"/>
-              <a:t>20.11.12</a:t>
+              <a:t>11/21/2012</a:t>
             </a:fld>
             <a:endParaRPr lang="en-US"/>
           </a:p>
@@ -5466,7 +5466,7 @@
           <a:p>
             <a:fld id="{4251665B-C24A-4702-B522-6A4334602E03}" type="datetimeFigureOut">
               <a:rPr lang="en-US" smtClean="0"/>
-              <a:t>20.11.12</a:t>
+              <a:t>11/21/2012</a:t>
             </a:fld>
             <a:endParaRPr lang="en-US"/>
           </a:p>
@@ -5801,7 +5801,7 @@
           <a:p>
             <a:fld id="{4251665B-C24A-4702-B522-6A4334602E03}" type="datetimeFigureOut">
               <a:rPr lang="en-US" smtClean="0"/>
-              <a:t>20.11.12</a:t>
+              <a:t>11/21/2012</a:t>
             </a:fld>
             <a:endParaRPr lang="en-US"/>
           </a:p>
@@ -6424,7 +6424,7 @@
           <a:p>
             <a:fld id="{4251665B-C24A-4702-B522-6A4334602E03}" type="datetimeFigureOut">
               <a:rPr lang="en-US" smtClean="0"/>
-              <a:t>20.11.12</a:t>
+              <a:t>11/21/2012</a:t>
             </a:fld>
             <a:endParaRPr lang="en-US"/>
           </a:p>
@@ -6911,7 +6911,7 @@
           <a:p>
             <a:fld id="{4251665B-C24A-4702-B522-6A4334602E03}" type="datetimeFigureOut">
               <a:rPr lang="en-US" smtClean="0"/>
-              <a:t>20.11.12</a:t>
+              <a:t>11/21/2012</a:t>
             </a:fld>
             <a:endParaRPr lang="en-US"/>
           </a:p>
@@ -7120,7 +7120,7 @@
           <a:p>
             <a:fld id="{4251665B-C24A-4702-B522-6A4334602E03}" type="datetimeFigureOut">
               <a:rPr lang="en-US" smtClean="0"/>
-              <a:t>20.11.12</a:t>
+              <a:t>11/21/2012</a:t>
             </a:fld>
             <a:endParaRPr lang="en-US"/>
           </a:p>
@@ -7600,18 +7600,18 @@
   <p:clrMapOvr>
     <a:masterClrMapping/>
   </p:clrMapOvr>
-  <mc:AlternateContent xmlns:mc="http://schemas.openxmlformats.org/markup-compatibility/2006">
-    <mc:Choice xmlns:p14="http://schemas.microsoft.com/office/powerpoint/2010/main" Requires="p14">
+  <mc:AlternateContent xmlns:mc="http://schemas.openxmlformats.org/markup-compatibility/2006" xmlns:p14="http://schemas.microsoft.com/office/powerpoint/2010/main">
+    <mc:Choice Requires="p14">
       <p:transition spd="slow" p14:dur="2000" advTm="5090"/>
     </mc:Choice>
-    <mc:Fallback>
+    <mc:Fallback xmlns="">
       <p:transition xmlns:p14="http://schemas.microsoft.com/office/powerpoint/2010/main" spd="slow" advTm="5090"/>
     </mc:Fallback>
   </mc:AlternateContent>
   <p:timing>
     <p:tnLst>
       <p:par>
-        <p:cTn xmlns:p14="http://schemas.microsoft.com/office/powerpoint/2010/main" id="1" dur="indefinite" restart="never" nodeType="tmRoot"/>
+        <p:cTn id="1" dur="indefinite" restart="never" nodeType="tmRoot"/>
       </p:par>
     </p:tnLst>
   </p:timing>
@@ -7679,7 +7679,7 @@
           <p:nvPr/>
         </p:nvPicPr>
         <p:blipFill>
-          <a:blip r:embed="rId3">
+          <a:blip r:embed="rId3" cstate="email">
             <a:extLst>
               <a:ext uri="{28A0092B-C50C-407E-A947-70E740481C1C}">
                 <a14:useLocalDpi xmlns:a14="http://schemas.microsoft.com/office/drawing/2010/main" val="0"/>
@@ -7714,7 +7714,7 @@
           <p:nvPr/>
         </p:nvPicPr>
         <p:blipFill>
-          <a:blip r:embed="rId4">
+          <a:blip r:embed="rId4" cstate="email">
             <a:extLst>
               <a:ext uri="{28A0092B-C50C-407E-A947-70E740481C1C}">
                 <a14:useLocalDpi xmlns:a14="http://schemas.microsoft.com/office/drawing/2010/main" val="0"/>
@@ -7815,6 +7815,13 @@
   <p:clrMapOvr>
     <a:masterClrMapping/>
   </p:clrMapOvr>
+  <p:timing>
+    <p:tnLst>
+      <p:par>
+        <p:cTn id="1" dur="indefinite" restart="never" nodeType="tmRoot"/>
+      </p:par>
+    </p:tnLst>
+  </p:timing>
 </p:sld>
 </file>
 
@@ -7940,7 +7947,7 @@
           <p:nvPr/>
         </p:nvPicPr>
         <p:blipFill>
-          <a:blip r:embed="rId2">
+          <a:blip r:embed="rId2" cstate="email">
             <a:extLst>
               <a:ext uri="{28A0092B-C50C-407E-A947-70E740481C1C}">
                 <a14:useLocalDpi xmlns:a14="http://schemas.microsoft.com/office/drawing/2010/main" val="0"/>
@@ -7976,6 +7983,13 @@
   <p:clrMapOvr>
     <a:masterClrMapping/>
   </p:clrMapOvr>
+  <p:timing>
+    <p:tnLst>
+      <p:par>
+        <p:cTn id="1" dur="indefinite" restart="never" nodeType="tmRoot"/>
+      </p:par>
+    </p:tnLst>
+  </p:timing>
 </p:sld>
 </file>
 
@@ -8061,7 +8075,7 @@
           <p:nvPr/>
         </p:nvPicPr>
         <p:blipFill>
-          <a:blip r:embed="rId2">
+          <a:blip r:embed="rId2" cstate="email">
             <a:extLst>
               <a:ext uri="{28A0092B-C50C-407E-A947-70E740481C1C}">
                 <a14:useLocalDpi xmlns:a14="http://schemas.microsoft.com/office/drawing/2010/main" val="0"/>
@@ -8097,6 +8111,13 @@
   <p:clrMapOvr>
     <a:masterClrMapping/>
   </p:clrMapOvr>
+  <p:timing>
+    <p:tnLst>
+      <p:par>
+        <p:cTn id="1" dur="indefinite" restart="never" nodeType="tmRoot"/>
+      </p:par>
+    </p:tnLst>
+  </p:timing>
 </p:sld>
 </file>
 
@@ -8225,7 +8246,7 @@
   <p:timing>
     <p:tnLst>
       <p:par>
-        <p:cTn xmlns:p14="http://schemas.microsoft.com/office/powerpoint/2010/main" id="1" dur="indefinite" restart="never" nodeType="tmRoot"/>
+        <p:cTn id="1" dur="indefinite" restart="never" nodeType="tmRoot"/>
       </p:par>
     </p:tnLst>
   </p:timing>
@@ -8395,18 +8416,18 @@
   <p:clrMapOvr>
     <a:masterClrMapping/>
   </p:clrMapOvr>
-  <mc:AlternateContent xmlns:mc="http://schemas.openxmlformats.org/markup-compatibility/2006">
-    <mc:Choice xmlns:p14="http://schemas.microsoft.com/office/powerpoint/2010/main" Requires="p14">
+  <mc:AlternateContent xmlns:mc="http://schemas.openxmlformats.org/markup-compatibility/2006" xmlns:p14="http://schemas.microsoft.com/office/powerpoint/2010/main">
+    <mc:Choice Requires="p14">
       <p:transition spd="slow" p14:dur="2000" advTm="1741"/>
     </mc:Choice>
-    <mc:Fallback>
+    <mc:Fallback xmlns="">
       <p:transition xmlns:p14="http://schemas.microsoft.com/office/powerpoint/2010/main" spd="slow" advTm="1741"/>
     </mc:Fallback>
   </mc:AlternateContent>
   <p:timing>
     <p:tnLst>
       <p:par>
-        <p:cTn xmlns:p14="http://schemas.microsoft.com/office/powerpoint/2010/main" id="1" dur="indefinite" restart="never" nodeType="tmRoot"/>
+        <p:cTn id="1" dur="indefinite" restart="never" nodeType="tmRoot"/>
       </p:par>
     </p:tnLst>
   </p:timing>
@@ -8463,6 +8484,13 @@
   <p:clrMapOvr>
     <a:masterClrMapping/>
   </p:clrMapOvr>
+  <p:timing>
+    <p:tnLst>
+      <p:par>
+        <p:cTn id="1" dur="indefinite" restart="never" nodeType="tmRoot"/>
+      </p:par>
+    </p:tnLst>
+  </p:timing>
 </p:sld>
 </file>
 
@@ -8599,18 +8627,18 @@
   <p:clrMapOvr>
     <a:masterClrMapping/>
   </p:clrMapOvr>
-  <mc:AlternateContent xmlns:mc="http://schemas.openxmlformats.org/markup-compatibility/2006">
-    <mc:Choice xmlns:p14="http://schemas.microsoft.com/office/powerpoint/2010/main" Requires="p14">
+  <mc:AlternateContent xmlns:mc="http://schemas.openxmlformats.org/markup-compatibility/2006" xmlns:p14="http://schemas.microsoft.com/office/powerpoint/2010/main">
+    <mc:Choice Requires="p14">
       <p:transition spd="slow" p14:dur="2000" advTm="1555"/>
     </mc:Choice>
-    <mc:Fallback>
+    <mc:Fallback xmlns="">
       <p:transition xmlns:p14="http://schemas.microsoft.com/office/powerpoint/2010/main" spd="slow" advTm="1555"/>
     </mc:Fallback>
   </mc:AlternateContent>
   <p:timing>
     <p:tnLst>
       <p:par>
-        <p:cTn xmlns:p14="http://schemas.microsoft.com/office/powerpoint/2010/main" id="1" dur="indefinite" restart="never" nodeType="tmRoot"/>
+        <p:cTn id="1" dur="indefinite" restart="never" nodeType="tmRoot"/>
       </p:par>
     </p:tnLst>
   </p:timing>
@@ -8651,7 +8679,15 @@
           <a:p>
             <a:r>
               <a:rPr lang="de-DE" dirty="0" smtClean="0"/>
-              <a:t>Neuerungen</a:t>
+              <a:t>Neuerungen </a:t>
+            </a:r>
+            <a:r>
+              <a:rPr lang="de-DE" dirty="0" err="1" smtClean="0"/>
+              <a:t>ggü</a:t>
+            </a:r>
+            <a:r>
+              <a:rPr lang="de-DE" dirty="0" smtClean="0"/>
+              <a:t>. Swing</a:t>
             </a:r>
             <a:endParaRPr lang="de-DE" dirty="0"/>
           </a:p>
@@ -8979,7 +9015,7 @@
   <p:timing>
     <p:tnLst>
       <p:par>
-        <p:cTn xmlns:p14="http://schemas.microsoft.com/office/powerpoint/2010/main" id="1" dur="indefinite" restart="never" nodeType="tmRoot"/>
+        <p:cTn id="1" dur="indefinite" restart="never" nodeType="tmRoot"/>
       </p:par>
     </p:tnLst>
   </p:timing>
@@ -9036,6 +9072,13 @@
   <p:clrMapOvr>
     <a:masterClrMapping/>
   </p:clrMapOvr>
+  <p:timing>
+    <p:tnLst>
+      <p:par>
+        <p:cTn id="1" dur="indefinite" restart="never" nodeType="tmRoot"/>
+      </p:par>
+    </p:tnLst>
+  </p:timing>
 </p:sld>
 </file>
 
@@ -9126,18 +9169,18 @@
   <p:clrMapOvr>
     <a:masterClrMapping/>
   </p:clrMapOvr>
-  <mc:AlternateContent xmlns:mc="http://schemas.openxmlformats.org/markup-compatibility/2006">
-    <mc:Choice xmlns:p14="http://schemas.microsoft.com/office/powerpoint/2010/main" Requires="p14">
+  <mc:AlternateContent xmlns:mc="http://schemas.openxmlformats.org/markup-compatibility/2006" xmlns:p14="http://schemas.microsoft.com/office/powerpoint/2010/main">
+    <mc:Choice Requires="p14">
       <p:transition spd="slow" p14:dur="2000" advTm="341"/>
     </mc:Choice>
-    <mc:Fallback>
+    <mc:Fallback xmlns="">
       <p:transition xmlns:p14="http://schemas.microsoft.com/office/powerpoint/2010/main" spd="slow" advTm="341"/>
     </mc:Fallback>
   </mc:AlternateContent>
   <p:timing>
     <p:tnLst>
       <p:par>
-        <p:cTn xmlns:p14="http://schemas.microsoft.com/office/powerpoint/2010/main" id="1" dur="indefinite" restart="never" nodeType="tmRoot"/>
+        <p:cTn id="1" dur="indefinite" restart="never" nodeType="tmRoot"/>
       </p:par>
     </p:tnLst>
   </p:timing>
@@ -9214,7 +9257,33 @@
             </a:r>
             <a:r>
               <a:rPr lang="de-DE" dirty="0" smtClean="0"/>
-              <a:t>-API konstruierbar</a:t>
+              <a:t>-API </a:t>
+            </a:r>
+            <a:r>
+              <a:rPr lang="de-DE" dirty="0" smtClean="0"/>
+              <a:t>konstruierbar</a:t>
+            </a:r>
+          </a:p>
+          <a:p>
+            <a:r>
+              <a:rPr lang="de-DE" dirty="0" smtClean="0"/>
+              <a:t>Java8 </a:t>
+            </a:r>
+            <a:r>
+              <a:rPr lang="de-DE" dirty="0" err="1" smtClean="0"/>
+              <a:t>Closures</a:t>
+            </a:r>
+            <a:r>
+              <a:rPr lang="de-DE" dirty="0" smtClean="0"/>
+              <a:t> (anonyme Klassen mit </a:t>
+            </a:r>
+            <a:r>
+              <a:rPr lang="de-DE" smtClean="0"/>
+              <a:t>1 Methode</a:t>
+            </a:r>
+            <a:r>
+              <a:rPr lang="de-DE" dirty="0" smtClean="0"/>
+              <a:t>)</a:t>
             </a:r>
             <a:endParaRPr lang="de-DE" dirty="0"/>
           </a:p>
@@ -9229,7 +9298,7 @@
           <p:nvPr/>
         </p:nvPicPr>
         <p:blipFill>
-          <a:blip r:embed="rId2">
+          <a:blip r:embed="rId2" cstate="email">
             <a:extLst>
               <a:ext uri="{28A0092B-C50C-407E-A947-70E740481C1C}">
                 <a14:useLocalDpi xmlns:a14="http://schemas.microsoft.com/office/drawing/2010/main" val="0"/>
@@ -9268,7 +9337,7 @@
   <p:timing>
     <p:tnLst>
       <p:par>
-        <p:cTn xmlns:p14="http://schemas.microsoft.com/office/powerpoint/2010/main" id="1" dur="indefinite" restart="never" nodeType="tmRoot"/>
+        <p:cTn id="1" dur="indefinite" restart="never" nodeType="tmRoot"/>
       </p:par>
     </p:tnLst>
   </p:timing>
@@ -9391,6 +9460,13 @@
   <p:clrMapOvr>
     <a:masterClrMapping/>
   </p:clrMapOvr>
+  <p:timing>
+    <p:tnLst>
+      <p:par>
+        <p:cTn id="1" dur="indefinite" restart="never" nodeType="tmRoot"/>
+      </p:par>
+    </p:tnLst>
+  </p:timing>
 </p:sld>
 </file>
 

</xml_diff>

<commit_message>
changed screenshots in presentation
</commit_message>
<xml_diff>
--- a/JavaFX-UserGroup.pptx
+++ b/JavaFX-UserGroup.pptx
@@ -14231,7 +14231,7 @@
       </p:sp>
       <p:pic>
         <p:nvPicPr>
-          <p:cNvPr id="6145" name="Picture 1"/>
+          <p:cNvPr id="1026" name="Picture 2" descr="C:\jfxpresentation\1.png"/>
           <p:cNvPicPr>
             <a:picLocks noChangeAspect="1" noChangeArrowheads="1"/>
           </p:cNvPicPr>
@@ -14252,43 +14252,20 @@
         </p:blipFill>
         <p:spPr bwMode="auto">
           <a:xfrm>
-            <a:off x="1766048" y="3147452"/>
-            <a:ext cx="3933825" cy="2562225"/>
+            <a:off x="889314" y="2680443"/>
+            <a:ext cx="5323229" cy="2976288"/>
           </a:xfrm>
           <a:prstGeom prst="rect">
             <a:avLst/>
           </a:prstGeom>
           <a:noFill/>
-          <a:ln>
-            <a:noFill/>
-          </a:ln>
-          <a:effectLst/>
           <a:extLst>
             <a:ext uri="{909E8E84-426E-40DD-AFC4-6F175D3DCCD1}">
               <a14:hiddenFill xmlns:a14="http://schemas.microsoft.com/office/drawing/2010/main">
                 <a:solidFill>
-                  <a:schemeClr val="accent1"/>
+                  <a:srgbClr val="FFFFFF"/>
                 </a:solidFill>
               </a14:hiddenFill>
-            </a:ext>
-            <a:ext uri="{91240B29-F687-4F45-9708-019B960494DF}">
-              <a14:hiddenLine xmlns:a14="http://schemas.microsoft.com/office/drawing/2010/main" w="9525">
-                <a:solidFill>
-                  <a:schemeClr val="tx1"/>
-                </a:solidFill>
-                <a:miter lim="800000"/>
-                <a:headEnd/>
-                <a:tailEnd/>
-              </a14:hiddenLine>
-            </a:ext>
-            <a:ext uri="{AF507438-7753-43E0-B8FC-AC1667EBCBE1}">
-              <a14:hiddenEffects xmlns:a14="http://schemas.microsoft.com/office/drawing/2010/main">
-                <a:effectLst>
-                  <a:outerShdw dist="35921" dir="2700000" algn="ctr" rotWithShape="0">
-                    <a:schemeClr val="bg2"/>
-                  </a:outerShdw>
-                </a:effectLst>
-              </a14:hiddenEffects>
             </a:ext>
           </a:extLst>
         </p:spPr>
@@ -14456,13 +14433,13 @@
       </p:sp>
       <p:pic>
         <p:nvPicPr>
-          <p:cNvPr id="6146" name="Picture 2"/>
+          <p:cNvPr id="2050" name="Picture 2" descr="C:\jfxpresentation\2.png"/>
           <p:cNvPicPr>
             <a:picLocks noChangeAspect="1" noChangeArrowheads="1"/>
           </p:cNvPicPr>
           <p:nvPr/>
         </p:nvPicPr>
-        <p:blipFill>
+        <p:blipFill rotWithShape="1">
           <a:blip r:embed="rId3">
             <a:extLst>
               <a:ext uri="{28A0092B-C50C-407E-A947-70E740481C1C}">
@@ -14470,50 +14447,25 @@
               </a:ext>
             </a:extLst>
           </a:blip>
-          <a:srcRect/>
-          <a:stretch>
-            <a:fillRect/>
-          </a:stretch>
+          <a:srcRect b="442"/>
+          <a:stretch/>
         </p:blipFill>
         <p:spPr bwMode="auto">
           <a:xfrm>
-            <a:off x="1749520" y="3182465"/>
-            <a:ext cx="5591175" cy="2505075"/>
+            <a:off x="887369" y="2680441"/>
+            <a:ext cx="6877353" cy="3128915"/>
           </a:xfrm>
           <a:prstGeom prst="rect">
             <a:avLst/>
           </a:prstGeom>
           <a:noFill/>
-          <a:ln>
-            <a:noFill/>
-          </a:ln>
-          <a:effectLst/>
           <a:extLst>
             <a:ext uri="{909E8E84-426E-40DD-AFC4-6F175D3DCCD1}">
               <a14:hiddenFill xmlns:a14="http://schemas.microsoft.com/office/drawing/2010/main">
                 <a:solidFill>
-                  <a:schemeClr val="accent1"/>
+                  <a:srgbClr val="FFFFFF"/>
                 </a:solidFill>
               </a14:hiddenFill>
-            </a:ext>
-            <a:ext uri="{91240B29-F687-4F45-9708-019B960494DF}">
-              <a14:hiddenLine xmlns:a14="http://schemas.microsoft.com/office/drawing/2010/main" w="9525">
-                <a:solidFill>
-                  <a:schemeClr val="tx1"/>
-                </a:solidFill>
-                <a:miter lim="800000"/>
-                <a:headEnd/>
-                <a:tailEnd/>
-              </a14:hiddenLine>
-            </a:ext>
-            <a:ext uri="{AF507438-7753-43E0-B8FC-AC1667EBCBE1}">
-              <a14:hiddenEffects xmlns:a14="http://schemas.microsoft.com/office/drawing/2010/main">
-                <a:effectLst>
-                  <a:outerShdw dist="35921" dir="2700000" algn="ctr" rotWithShape="0">
-                    <a:schemeClr val="bg2"/>
-                  </a:outerShdw>
-                </a:effectLst>
-              </a14:hiddenEffects>
             </a:ext>
           </a:extLst>
         </p:spPr>
@@ -14681,13 +14633,13 @@
       </p:sp>
       <p:pic>
         <p:nvPicPr>
-          <p:cNvPr id="6147" name="Picture 3"/>
+          <p:cNvPr id="3074" name="Picture 2" descr="C:\jfxpresentation\3.png"/>
           <p:cNvPicPr>
             <a:picLocks noChangeAspect="1" noChangeArrowheads="1"/>
           </p:cNvPicPr>
           <p:nvPr/>
         </p:nvPicPr>
-        <p:blipFill>
+        <p:blipFill rotWithShape="1">
           <a:blip r:embed="rId3">
             <a:extLst>
               <a:ext uri="{28A0092B-C50C-407E-A947-70E740481C1C}">
@@ -14695,50 +14647,25 @@
               </a:ext>
             </a:extLst>
           </a:blip>
-          <a:srcRect/>
-          <a:stretch>
-            <a:fillRect/>
-          </a:stretch>
+          <a:srcRect b="1268"/>
+          <a:stretch/>
         </p:blipFill>
         <p:spPr bwMode="auto">
           <a:xfrm>
-            <a:off x="1785657" y="3161461"/>
-            <a:ext cx="6067425" cy="2543175"/>
+            <a:off x="889930" y="2671476"/>
+            <a:ext cx="6824754" cy="3128921"/>
           </a:xfrm>
           <a:prstGeom prst="rect">
             <a:avLst/>
           </a:prstGeom>
           <a:noFill/>
-          <a:ln>
-            <a:noFill/>
-          </a:ln>
-          <a:effectLst/>
           <a:extLst>
             <a:ext uri="{909E8E84-426E-40DD-AFC4-6F175D3DCCD1}">
               <a14:hiddenFill xmlns:a14="http://schemas.microsoft.com/office/drawing/2010/main">
                 <a:solidFill>
-                  <a:schemeClr val="accent1"/>
+                  <a:srgbClr val="FFFFFF"/>
                 </a:solidFill>
               </a14:hiddenFill>
-            </a:ext>
-            <a:ext uri="{91240B29-F687-4F45-9708-019B960494DF}">
-              <a14:hiddenLine xmlns:a14="http://schemas.microsoft.com/office/drawing/2010/main" w="9525">
-                <a:solidFill>
-                  <a:schemeClr val="tx1"/>
-                </a:solidFill>
-                <a:miter lim="800000"/>
-                <a:headEnd/>
-                <a:tailEnd/>
-              </a14:hiddenLine>
-            </a:ext>
-            <a:ext uri="{AF507438-7753-43E0-B8FC-AC1667EBCBE1}">
-              <a14:hiddenEffects xmlns:a14="http://schemas.microsoft.com/office/drawing/2010/main">
-                <a:effectLst>
-                  <a:outerShdw dist="35921" dir="2700000" algn="ctr" rotWithShape="0">
-                    <a:schemeClr val="bg2"/>
-                  </a:outerShdw>
-                </a:effectLst>
-              </a14:hiddenEffects>
             </a:ext>
           </a:extLst>
         </p:spPr>
@@ -14906,13 +14833,13 @@
       </p:sp>
       <p:pic>
         <p:nvPicPr>
-          <p:cNvPr id="6149" name="Picture 5"/>
+          <p:cNvPr id="4098" name="Picture 2" descr="C:\jfxpresentation\4.png"/>
           <p:cNvPicPr>
             <a:picLocks noChangeAspect="1" noChangeArrowheads="1"/>
           </p:cNvPicPr>
           <p:nvPr/>
         </p:nvPicPr>
-        <p:blipFill>
+        <p:blipFill rotWithShape="1">
           <a:blip r:embed="rId3">
             <a:extLst>
               <a:ext uri="{28A0092B-C50C-407E-A947-70E740481C1C}">
@@ -14920,50 +14847,25 @@
               </a:ext>
             </a:extLst>
           </a:blip>
-          <a:srcRect/>
-          <a:stretch>
-            <a:fillRect/>
-          </a:stretch>
+          <a:srcRect b="1072"/>
+          <a:stretch/>
         </p:blipFill>
         <p:spPr bwMode="auto">
           <a:xfrm>
-            <a:off x="1801898" y="3147171"/>
-            <a:ext cx="6124575" cy="3381375"/>
+            <a:off x="877327" y="2698371"/>
+            <a:ext cx="6783509" cy="3875611"/>
           </a:xfrm>
           <a:prstGeom prst="rect">
             <a:avLst/>
           </a:prstGeom>
           <a:noFill/>
-          <a:ln>
-            <a:noFill/>
-          </a:ln>
-          <a:effectLst/>
           <a:extLst>
             <a:ext uri="{909E8E84-426E-40DD-AFC4-6F175D3DCCD1}">
               <a14:hiddenFill xmlns:a14="http://schemas.microsoft.com/office/drawing/2010/main">
                 <a:solidFill>
-                  <a:schemeClr val="accent1"/>
+                  <a:srgbClr val="FFFFFF"/>
                 </a:solidFill>
               </a14:hiddenFill>
-            </a:ext>
-            <a:ext uri="{91240B29-F687-4F45-9708-019B960494DF}">
-              <a14:hiddenLine xmlns:a14="http://schemas.microsoft.com/office/drawing/2010/main" w="9525">
-                <a:solidFill>
-                  <a:schemeClr val="tx1"/>
-                </a:solidFill>
-                <a:miter lim="800000"/>
-                <a:headEnd/>
-                <a:tailEnd/>
-              </a14:hiddenLine>
-            </a:ext>
-            <a:ext uri="{AF507438-7753-43E0-B8FC-AC1667EBCBE1}">
-              <a14:hiddenEffects xmlns:a14="http://schemas.microsoft.com/office/drawing/2010/main">
-                <a:effectLst>
-                  <a:outerShdw dist="35921" dir="2700000" algn="ctr" rotWithShape="0">
-                    <a:schemeClr val="bg2"/>
-                  </a:outerShdw>
-                </a:effectLst>
-              </a14:hiddenEffects>
             </a:ext>
           </a:extLst>
         </p:spPr>
@@ -15137,145 +15039,47 @@
           </a:p>
         </p:txBody>
       </p:sp>
-      <p:grpSp>
-        <p:nvGrpSpPr>
-          <p:cNvPr id="6" name="Gruppieren 5"/>
-          <p:cNvGrpSpPr/>
+      <p:pic>
+        <p:nvPicPr>
+          <p:cNvPr id="5122" name="Picture 2" descr="C:\jfxpresentation\5.png"/>
+          <p:cNvPicPr>
+            <a:picLocks noChangeAspect="1" noChangeArrowheads="1"/>
+          </p:cNvPicPr>
           <p:nvPr/>
-        </p:nvGrpSpPr>
-        <p:grpSpPr>
-          <a:xfrm>
-            <a:off x="1780327" y="3144648"/>
-            <a:ext cx="6067426" cy="3419475"/>
-            <a:chOff x="1672758" y="2929498"/>
-            <a:chExt cx="6067426" cy="3419475"/>
-          </a:xfrm>
-        </p:grpSpPr>
-        <p:pic>
-          <p:nvPicPr>
-            <p:cNvPr id="6150" name="Picture 6"/>
-            <p:cNvPicPr>
-              <a:picLocks noChangeAspect="1" noChangeArrowheads="1"/>
-            </p:cNvPicPr>
-            <p:nvPr/>
-          </p:nvPicPr>
-          <p:blipFill>
-            <a:blip r:embed="rId3">
-              <a:extLst>
-                <a:ext uri="{28A0092B-C50C-407E-A947-70E740481C1C}">
-                  <a14:useLocalDpi xmlns:a14="http://schemas.microsoft.com/office/drawing/2010/main" val="0"/>
-                </a:ext>
-              </a:extLst>
-            </a:blip>
-            <a:srcRect/>
-            <a:stretch>
-              <a:fillRect/>
-            </a:stretch>
-          </p:blipFill>
-          <p:spPr bwMode="auto">
-            <a:xfrm>
-              <a:off x="1672759" y="2929498"/>
-              <a:ext cx="6067425" cy="3419475"/>
-            </a:xfrm>
-            <a:prstGeom prst="rect">
-              <a:avLst/>
-            </a:prstGeom>
-            <a:noFill/>
-            <a:ln>
-              <a:noFill/>
-            </a:ln>
-            <a:effectLst/>
+        </p:nvPicPr>
+        <p:blipFill>
+          <a:blip r:embed="rId3">
             <a:extLst>
-              <a:ext uri="{909E8E84-426E-40DD-AFC4-6F175D3DCCD1}">
-                <a14:hiddenFill xmlns:a14="http://schemas.microsoft.com/office/drawing/2010/main">
-                  <a:solidFill>
-                    <a:schemeClr val="accent1"/>
-                  </a:solidFill>
-                </a14:hiddenFill>
-              </a:ext>
-              <a:ext uri="{91240B29-F687-4F45-9708-019B960494DF}">
-                <a14:hiddenLine xmlns:a14="http://schemas.microsoft.com/office/drawing/2010/main" w="9525">
-                  <a:solidFill>
-                    <a:schemeClr val="tx1"/>
-                  </a:solidFill>
-                  <a:miter lim="800000"/>
-                  <a:headEnd/>
-                  <a:tailEnd/>
-                </a14:hiddenLine>
-              </a:ext>
-              <a:ext uri="{AF507438-7753-43E0-B8FC-AC1667EBCBE1}">
-                <a14:hiddenEffects xmlns:a14="http://schemas.microsoft.com/office/drawing/2010/main">
-                  <a:effectLst>
-                    <a:outerShdw dist="35921" dir="2700000" algn="ctr" rotWithShape="0">
-                      <a:schemeClr val="bg2"/>
-                    </a:outerShdw>
-                  </a:effectLst>
-                </a14:hiddenEffects>
+              <a:ext uri="{28A0092B-C50C-407E-A947-70E740481C1C}">
+                <a14:useLocalDpi xmlns:a14="http://schemas.microsoft.com/office/drawing/2010/main" val="0"/>
               </a:ext>
             </a:extLst>
-          </p:spPr>
-        </p:pic>
-        <p:cxnSp>
-          <p:nvCxnSpPr>
-            <p:cNvPr id="4" name="Gerade Verbindung 3"/>
-            <p:cNvCxnSpPr/>
-            <p:nvPr/>
-          </p:nvCxnSpPr>
-          <p:spPr>
-            <a:xfrm>
-              <a:off x="1672759" y="4814047"/>
-              <a:ext cx="3939147" cy="564777"/>
-            </a:xfrm>
-            <a:prstGeom prst="line">
-              <a:avLst/>
-            </a:prstGeom>
-          </p:spPr>
-          <p:style>
-            <a:lnRef idx="2">
-              <a:schemeClr val="accent1"/>
-            </a:lnRef>
-            <a:fillRef idx="0">
-              <a:schemeClr val="accent1"/>
-            </a:fillRef>
-            <a:effectRef idx="1">
-              <a:schemeClr val="accent1"/>
-            </a:effectRef>
-            <a:fontRef idx="minor">
-              <a:schemeClr val="tx1"/>
-            </a:fontRef>
-          </p:style>
-        </p:cxnSp>
-        <p:cxnSp>
-          <p:nvCxnSpPr>
-            <p:cNvPr id="13" name="Gerade Verbindung 12"/>
-            <p:cNvCxnSpPr/>
-            <p:nvPr/>
-          </p:nvCxnSpPr>
-          <p:spPr>
-            <a:xfrm flipV="1">
-              <a:off x="1672758" y="4814047"/>
-              <a:ext cx="3939148" cy="564777"/>
-            </a:xfrm>
-            <a:prstGeom prst="line">
-              <a:avLst/>
-            </a:prstGeom>
-          </p:spPr>
-          <p:style>
-            <a:lnRef idx="2">
-              <a:schemeClr val="accent1"/>
-            </a:lnRef>
-            <a:fillRef idx="0">
-              <a:schemeClr val="accent1"/>
-            </a:fillRef>
-            <a:effectRef idx="1">
-              <a:schemeClr val="accent1"/>
-            </a:effectRef>
-            <a:fontRef idx="minor">
-              <a:schemeClr val="tx1"/>
-            </a:fontRef>
-          </p:style>
-        </p:cxnSp>
-      </p:grpSp>
+          </a:blip>
+          <a:srcRect/>
+          <a:stretch>
+            <a:fillRect/>
+          </a:stretch>
+        </p:blipFill>
+        <p:spPr bwMode="auto">
+          <a:xfrm>
+            <a:off x="891706" y="2662511"/>
+            <a:ext cx="6744070" cy="3996486"/>
+          </a:xfrm>
+          <a:prstGeom prst="rect">
+            <a:avLst/>
+          </a:prstGeom>
+          <a:noFill/>
+          <a:extLst>
+            <a:ext uri="{909E8E84-426E-40DD-AFC4-6F175D3DCCD1}">
+              <a14:hiddenFill xmlns:a14="http://schemas.microsoft.com/office/drawing/2010/main">
+                <a:solidFill>
+                  <a:srgbClr val="FFFFFF"/>
+                </a:solidFill>
+              </a14:hiddenFill>
+            </a:ext>
+          </a:extLst>
+        </p:spPr>
+      </p:pic>
     </p:spTree>
     <p:extLst>
       <p:ext uri="{BB962C8B-B14F-4D97-AF65-F5344CB8AC3E}">
@@ -15443,7 +15247,7 @@
         </p:nvSpPr>
         <p:spPr>
           <a:xfrm>
-            <a:off x="431321" y="3338429"/>
+            <a:off x="234091" y="3338429"/>
             <a:ext cx="1765227" cy="369332"/>
           </a:xfrm>
           <a:prstGeom prst="rect">
@@ -15519,7 +15323,7 @@
         </p:nvSpPr>
         <p:spPr>
           <a:xfrm>
-            <a:off x="3033623" y="3338429"/>
+            <a:off x="2710883" y="3338429"/>
             <a:ext cx="2021707" cy="369332"/>
           </a:xfrm>
           <a:prstGeom prst="rect">
@@ -15595,7 +15399,7 @@
         </p:nvSpPr>
         <p:spPr>
           <a:xfrm>
-            <a:off x="6408849" y="3338429"/>
+            <a:off x="6077144" y="3338429"/>
             <a:ext cx="2021707" cy="369332"/>
           </a:xfrm>
           <a:prstGeom prst="rect">
@@ -16734,17 +16538,8 @@
             <a:pPr lvl="1"/>
             <a:r>
               <a:rPr lang="de-DE" dirty="0" smtClean="0"/>
-              <a:t>Trennung </a:t>
-            </a:r>
-            <a:r>
-              <a:rPr lang="de-DE" dirty="0" smtClean="0"/>
-              <a:t>GUI / </a:t>
-            </a:r>
-            <a:r>
-              <a:rPr lang="de-DE" dirty="0" smtClean="0"/>
-              <a:t>Implementierung</a:t>
-            </a:r>
-            <a:endParaRPr lang="de-DE" dirty="0" smtClean="0"/>
+              <a:t>Trennung GUI / Implementierung</a:t>
+            </a:r>
           </a:p>
         </p:txBody>
       </p:sp>

</xml_diff>

<commit_message>
- refactoring: BugTracker -> CodeFactory - Slider only to 0.99, so that istEingegangen is not triggered - Start has been cleaned, is based on Soll now
</commit_message>
<xml_diff>
--- a/JavaFX-UserGroup.pptx
+++ b/JavaFX-UserGroup.pptx
@@ -15,9 +15,9 @@
     <p:sldId id="257" r:id="rId3"/>
     <p:sldId id="271" r:id="rId4"/>
     <p:sldId id="273" r:id="rId5"/>
-    <p:sldId id="258" r:id="rId6"/>
-    <p:sldId id="283" r:id="rId7"/>
-    <p:sldId id="274" r:id="rId8"/>
+    <p:sldId id="274" r:id="rId6"/>
+    <p:sldId id="258" r:id="rId7"/>
+    <p:sldId id="283" r:id="rId8"/>
     <p:sldId id="272" r:id="rId9"/>
     <p:sldId id="259" r:id="rId10"/>
     <p:sldId id="267" r:id="rId11"/>
@@ -215,7 +215,7 @@
           <a:p>
             <a:fld id="{F990E102-0E85-45BC-BC45-BAB9D66E7EF2}" type="datetimeFigureOut">
               <a:rPr lang="de-DE" smtClean="0"/>
-              <a:t>15.03.2013</a:t>
+              <a:t>18.03.2013</a:t>
             </a:fld>
             <a:endParaRPr lang="de-DE"/>
           </a:p>
@@ -380,7 +380,7 @@
           <a:p>
             <a:fld id="{D6E4795D-47E8-774D-9ED5-0B5304BFB957}" type="datetimeFigureOut">
               <a:rPr lang="de-DE" smtClean="0"/>
-              <a:t>15.03.2013</a:t>
+              <a:t>18.03.2013</a:t>
             </a:fld>
             <a:endParaRPr lang="de-DE"/>
           </a:p>
@@ -713,7 +713,7 @@
           <a:p>
             <a:fld id="{62491994-E55D-CE4B-A805-5346FBD73310}" type="slidenum">
               <a:rPr lang="de-DE" smtClean="0"/>
-              <a:t>7</a:t>
+              <a:t>5</a:t>
             </a:fld>
             <a:endParaRPr lang="de-DE"/>
           </a:p>
@@ -1164,6 +1164,122 @@
     <p:extLst>
       <p:ext uri="{BB962C8B-B14F-4D97-AF65-F5344CB8AC3E}">
         <p14:creationId xmlns:p14="http://schemas.microsoft.com/office/powerpoint/2010/main" val="227543728"/>
+      </p:ext>
+    </p:extLst>
+  </p:cSld>
+  <p:clrMapOvr>
+    <a:masterClrMapping/>
+  </p:clrMapOvr>
+</p:notes>
+</file>
+
+<file path=ppt/notesSlides/notesSlide13.xml><?xml version="1.0" encoding="utf-8"?>
+<p:notes xmlns:a="http://schemas.openxmlformats.org/drawingml/2006/main" xmlns:r="http://schemas.openxmlformats.org/officeDocument/2006/relationships" xmlns:p="http://schemas.openxmlformats.org/presentationml/2006/main">
+  <p:cSld>
+    <p:spTree>
+      <p:nvGrpSpPr>
+        <p:cNvPr id="1" name=""/>
+        <p:cNvGrpSpPr/>
+        <p:nvPr/>
+      </p:nvGrpSpPr>
+      <p:grpSpPr>
+        <a:xfrm>
+          <a:off x="0" y="0"/>
+          <a:ext cx="0" cy="0"/>
+          <a:chOff x="0" y="0"/>
+          <a:chExt cx="0" cy="0"/>
+        </a:xfrm>
+      </p:grpSpPr>
+      <p:sp>
+        <p:nvSpPr>
+          <p:cNvPr id="2" name="Folienbildplatzhalter 1"/>
+          <p:cNvSpPr>
+            <a:spLocks noGrp="1" noRot="1" noChangeAspect="1"/>
+          </p:cNvSpPr>
+          <p:nvPr>
+            <p:ph type="sldImg"/>
+          </p:nvPr>
+        </p:nvSpPr>
+        <p:spPr/>
+      </p:sp>
+      <p:sp>
+        <p:nvSpPr>
+          <p:cNvPr id="3" name="Notizenplatzhalter 2"/>
+          <p:cNvSpPr>
+            <a:spLocks noGrp="1"/>
+          </p:cNvSpPr>
+          <p:nvPr>
+            <p:ph type="body" idx="1"/>
+          </p:nvPr>
+        </p:nvSpPr>
+        <p:spPr/>
+        <p:txBody>
+          <a:bodyPr/>
+          <a:lstStyle/>
+          <a:p>
+            <a:pPr marL="171450" indent="-171450">
+              <a:buFont typeface="Arial" pitchFamily="34" charset="0"/>
+              <a:buChar char="•"/>
+            </a:pPr>
+            <a:r>
+              <a:rPr lang="de-DE" dirty="0" err="1" smtClean="0"/>
+              <a:t>OpenDolphin</a:t>
+            </a:r>
+            <a:r>
+              <a:rPr lang="de-DE" dirty="0" smtClean="0"/>
+              <a:t>: Synchronisierung zwischen </a:t>
+            </a:r>
+            <a:r>
+              <a:rPr lang="de-DE" dirty="0" err="1" smtClean="0"/>
+              <a:t>Server+Clients</a:t>
+            </a:r>
+            <a:r>
+              <a:rPr lang="de-DE" dirty="0" smtClean="0"/>
+              <a:t> über explizite</a:t>
+            </a:r>
+            <a:r>
+              <a:rPr lang="de-DE" baseline="0" dirty="0" smtClean="0"/>
+              <a:t> </a:t>
+            </a:r>
+            <a:r>
+              <a:rPr lang="de-DE" dirty="0" err="1" smtClean="0"/>
+              <a:t>Commands</a:t>
+            </a:r>
+            <a:r>
+              <a:rPr lang="de-DE" baseline="0" dirty="0" smtClean="0"/>
+              <a:t>; Groovy</a:t>
+            </a:r>
+            <a:endParaRPr lang="de-DE" dirty="0"/>
+          </a:p>
+        </p:txBody>
+      </p:sp>
+      <p:sp>
+        <p:nvSpPr>
+          <p:cNvPr id="4" name="Foliennummernplatzhalter 3"/>
+          <p:cNvSpPr>
+            <a:spLocks noGrp="1"/>
+          </p:cNvSpPr>
+          <p:nvPr>
+            <p:ph type="sldNum" sz="quarter" idx="10"/>
+          </p:nvPr>
+        </p:nvSpPr>
+        <p:spPr/>
+        <p:txBody>
+          <a:bodyPr/>
+          <a:lstStyle/>
+          <a:p>
+            <a:fld id="{62491994-E55D-CE4B-A805-5346FBD73310}" type="slidenum">
+              <a:rPr lang="de-DE" smtClean="0"/>
+              <a:t>21</a:t>
+            </a:fld>
+            <a:endParaRPr lang="de-DE"/>
+          </a:p>
+        </p:txBody>
+      </p:sp>
+    </p:spTree>
+    <p:extLst>
+      <p:ext uri="{BB962C8B-B14F-4D97-AF65-F5344CB8AC3E}">
+        <p14:creationId xmlns:p14="http://schemas.microsoft.com/office/powerpoint/2010/main" val="3940709244"/>
       </p:ext>
     </p:extLst>
   </p:cSld>
@@ -2219,7 +2335,7 @@
           <a:p>
             <a:fld id="{4251665B-C24A-4702-B522-6A4334602E03}" type="datetimeFigureOut">
               <a:rPr lang="en-US" smtClean="0"/>
-              <a:t>3/15/2013</a:t>
+              <a:t>3/18/2013</a:t>
             </a:fld>
             <a:endParaRPr lang="en-US" dirty="0"/>
           </a:p>
@@ -2513,7 +2629,7 @@
           <a:p>
             <a:fld id="{4251665B-C24A-4702-B522-6A4334602E03}" type="datetimeFigureOut">
               <a:rPr lang="en-US" smtClean="0"/>
-              <a:t>3/15/2013</a:t>
+              <a:t>3/18/2013</a:t>
             </a:fld>
             <a:endParaRPr lang="en-US"/>
           </a:p>
@@ -2848,7 +2964,7 @@
           <a:p>
             <a:fld id="{4251665B-C24A-4702-B522-6A4334602E03}" type="datetimeFigureOut">
               <a:rPr lang="en-US" smtClean="0"/>
-              <a:t>3/15/2013</a:t>
+              <a:t>3/18/2013</a:t>
             </a:fld>
             <a:endParaRPr lang="en-US"/>
           </a:p>
@@ -3270,7 +3386,7 @@
           <a:p>
             <a:fld id="{4251665B-C24A-4702-B522-6A4334602E03}" type="datetimeFigureOut">
               <a:rPr lang="en-US" smtClean="0"/>
-              <a:t>3/15/2013</a:t>
+              <a:t>3/18/2013</a:t>
             </a:fld>
             <a:endParaRPr lang="en-US"/>
           </a:p>
@@ -3687,7 +3803,7 @@
           <a:p>
             <a:fld id="{4251665B-C24A-4702-B522-6A4334602E03}" type="datetimeFigureOut">
               <a:rPr lang="en-US" smtClean="0"/>
-              <a:t>3/15/2013</a:t>
+              <a:t>3/18/2013</a:t>
             </a:fld>
             <a:endParaRPr lang="en-US"/>
           </a:p>
@@ -3820,7 +3936,7 @@
           <a:p>
             <a:fld id="{4251665B-C24A-4702-B522-6A4334602E03}" type="datetimeFigureOut">
               <a:rPr lang="en-US" smtClean="0"/>
-              <a:t>3/15/2013</a:t>
+              <a:t>3/18/2013</a:t>
             </a:fld>
             <a:endParaRPr lang="en-US"/>
           </a:p>
@@ -4142,7 +4258,7 @@
           <a:p>
             <a:fld id="{4251665B-C24A-4702-B522-6A4334602E03}" type="datetimeFigureOut">
               <a:rPr lang="en-US" smtClean="0"/>
-              <a:t>3/15/2013</a:t>
+              <a:t>3/18/2013</a:t>
             </a:fld>
             <a:endParaRPr lang="en-US"/>
           </a:p>
@@ -4387,7 +4503,7 @@
           <a:p>
             <a:fld id="{4251665B-C24A-4702-B522-6A4334602E03}" type="datetimeFigureOut">
               <a:rPr lang="en-US" smtClean="0"/>
-              <a:t>3/15/2013</a:t>
+              <a:t>3/18/2013</a:t>
             </a:fld>
             <a:endParaRPr lang="en-US"/>
           </a:p>
@@ -4725,7 +4841,7 @@
           <a:p>
             <a:fld id="{4251665B-C24A-4702-B522-6A4334602E03}" type="datetimeFigureOut">
               <a:rPr lang="en-US" smtClean="0"/>
-              <a:t>3/15/2013</a:t>
+              <a:t>3/18/2013</a:t>
             </a:fld>
             <a:endParaRPr lang="en-US"/>
           </a:p>
@@ -5025,7 +5141,7 @@
           <a:p>
             <a:fld id="{4251665B-C24A-4702-B522-6A4334602E03}" type="datetimeFigureOut">
               <a:rPr lang="en-US" smtClean="0"/>
-              <a:t>3/15/2013</a:t>
+              <a:t>3/18/2013</a:t>
             </a:fld>
             <a:endParaRPr lang="en-US"/>
           </a:p>
@@ -5432,7 +5548,7 @@
           <a:p>
             <a:fld id="{4251665B-C24A-4702-B522-6A4334602E03}" type="datetimeFigureOut">
               <a:rPr lang="en-US" smtClean="0"/>
-              <a:t>3/15/2013</a:t>
+              <a:t>3/18/2013</a:t>
             </a:fld>
             <a:endParaRPr lang="en-US"/>
           </a:p>
@@ -5894,7 +6010,7 @@
           <a:p>
             <a:fld id="{4251665B-C24A-4702-B522-6A4334602E03}" type="datetimeFigureOut">
               <a:rPr lang="en-US" smtClean="0"/>
-              <a:t>3/15/2013</a:t>
+              <a:t>3/18/2013</a:t>
             </a:fld>
             <a:endParaRPr lang="en-US"/>
           </a:p>
@@ -6120,7 +6236,7 @@
           <a:p>
             <a:fld id="{4251665B-C24A-4702-B522-6A4334602E03}" type="datetimeFigureOut">
               <a:rPr lang="en-US" smtClean="0"/>
-              <a:t>3/15/2013</a:t>
+              <a:t>3/18/2013</a:t>
             </a:fld>
             <a:endParaRPr lang="en-US"/>
           </a:p>
@@ -6497,7 +6613,7 @@
           <a:p>
             <a:fld id="{4251665B-C24A-4702-B522-6A4334602E03}" type="datetimeFigureOut">
               <a:rPr lang="en-US" smtClean="0"/>
-              <a:t>3/15/2013</a:t>
+              <a:t>3/18/2013</a:t>
             </a:fld>
             <a:endParaRPr lang="en-US"/>
           </a:p>
@@ -6824,7 +6940,7 @@
           <a:p>
             <a:fld id="{4251665B-C24A-4702-B522-6A4334602E03}" type="datetimeFigureOut">
               <a:rPr lang="en-US" smtClean="0"/>
-              <a:t>3/15/2013</a:t>
+              <a:t>3/18/2013</a:t>
             </a:fld>
             <a:endParaRPr lang="en-US"/>
           </a:p>
@@ -7159,7 +7275,7 @@
           <a:p>
             <a:fld id="{4251665B-C24A-4702-B522-6A4334602E03}" type="datetimeFigureOut">
               <a:rPr lang="en-US" smtClean="0"/>
-              <a:t>3/15/2013</a:t>
+              <a:t>3/18/2013</a:t>
             </a:fld>
             <a:endParaRPr lang="en-US"/>
           </a:p>
@@ -7782,7 +7898,7 @@
           <a:p>
             <a:fld id="{4251665B-C24A-4702-B522-6A4334602E03}" type="datetimeFigureOut">
               <a:rPr lang="en-US" smtClean="0"/>
-              <a:t>3/15/2013</a:t>
+              <a:t>3/18/2013</a:t>
             </a:fld>
             <a:endParaRPr lang="en-US"/>
           </a:p>
@@ -8269,7 +8385,7 @@
           <a:p>
             <a:fld id="{4251665B-C24A-4702-B522-6A4334602E03}" type="datetimeFigureOut">
               <a:rPr lang="en-US" smtClean="0"/>
-              <a:t>3/15/2013</a:t>
+              <a:t>3/18/2013</a:t>
             </a:fld>
             <a:endParaRPr lang="en-US"/>
           </a:p>
@@ -8478,7 +8594,7 @@
           <a:p>
             <a:fld id="{4251665B-C24A-4702-B522-6A4334602E03}" type="datetimeFigureOut">
               <a:rPr lang="en-US" smtClean="0"/>
-              <a:t>3/15/2013</a:t>
+              <a:t>3/18/2013</a:t>
             </a:fld>
             <a:endParaRPr lang="en-US"/>
           </a:p>
@@ -10345,11 +10461,7 @@
           <a:p>
             <a:r>
               <a:rPr lang="de-DE" dirty="0" smtClean="0"/>
-              <a:t>Properties </a:t>
-            </a:r>
-            <a:r>
-              <a:rPr lang="de-DE" dirty="0" smtClean="0"/>
-              <a:t>und </a:t>
+              <a:t>Properties und </a:t>
             </a:r>
             <a:r>
               <a:rPr lang="de-DE" dirty="0" err="1" smtClean="0"/>
@@ -10383,26 +10495,13 @@
           <a:p>
             <a:r>
               <a:rPr lang="de-DE" sz="2400" dirty="0" smtClean="0"/>
-              <a:t>Relationen zwischen </a:t>
-            </a:r>
+              <a:t>Relationen zwischen Properties</a:t>
+            </a:r>
+          </a:p>
+          <a:p>
             <a:r>
               <a:rPr lang="de-DE" sz="2400" dirty="0" smtClean="0"/>
-              <a:t>Properties</a:t>
-            </a:r>
-            <a:endParaRPr lang="de-DE" sz="2400" dirty="0" smtClean="0"/>
-          </a:p>
-          <a:p>
-            <a:r>
-              <a:rPr lang="de-DE" sz="2400" dirty="0" smtClean="0"/>
-              <a:t>Änderungen an gebundenen </a:t>
-            </a:r>
-            <a:r>
-              <a:rPr lang="de-DE" sz="2400" dirty="0" smtClean="0"/>
-              <a:t>Properties </a:t>
-            </a:r>
-            <a:r>
-              <a:rPr lang="de-DE" sz="2400" dirty="0" smtClean="0"/>
-              <a:t>wirken sich auf den Bindungspartner aus</a:t>
+              <a:t>Änderungen an gebundenen Properties wirken sich auf den Bindungspartner aus</a:t>
             </a:r>
           </a:p>
           <a:p>
@@ -10679,11 +10778,7 @@
           <a:p>
             <a:r>
               <a:rPr lang="de-DE" dirty="0" smtClean="0"/>
-              <a:t>Properties </a:t>
-            </a:r>
-            <a:r>
-              <a:rPr lang="de-DE" dirty="0" smtClean="0"/>
-              <a:t>und Events</a:t>
+              <a:t>Properties und Events</a:t>
             </a:r>
             <a:endParaRPr lang="de-DE" dirty="0"/>
           </a:p>
@@ -11081,11 +11176,7 @@
           <a:p>
             <a:r>
               <a:rPr lang="de-DE" dirty="0" smtClean="0"/>
-              <a:t>Properties </a:t>
-            </a:r>
-            <a:r>
-              <a:rPr lang="de-DE" dirty="0" smtClean="0"/>
-              <a:t>und </a:t>
+              <a:t>Properties und </a:t>
             </a:r>
             <a:r>
               <a:rPr lang="de-DE" dirty="0" err="1" smtClean="0"/>
@@ -11283,11 +11374,7 @@
           <a:p>
             <a:r>
               <a:rPr lang="de-DE" dirty="0" smtClean="0"/>
-              <a:t>Properties </a:t>
-            </a:r>
-            <a:r>
-              <a:rPr lang="de-DE" dirty="0" smtClean="0"/>
-              <a:t>und </a:t>
+              <a:t>Properties und </a:t>
             </a:r>
             <a:r>
               <a:rPr lang="de-DE" dirty="0" err="1" smtClean="0"/>
@@ -11483,11 +11570,7 @@
           <a:p>
             <a:r>
               <a:rPr lang="de-DE" dirty="0" smtClean="0"/>
-              <a:t>Properties </a:t>
-            </a:r>
-            <a:r>
-              <a:rPr lang="de-DE" dirty="0" smtClean="0"/>
-              <a:t>und </a:t>
+              <a:t>Properties und </a:t>
             </a:r>
             <a:r>
               <a:rPr lang="de-DE" dirty="0" err="1" smtClean="0"/>
@@ -12237,11 +12320,7 @@
             </a:r>
             <a:r>
               <a:rPr lang="de-DE" dirty="0" smtClean="0"/>
-              <a:t> </a:t>
-            </a:r>
-            <a:r>
-              <a:rPr lang="de-DE" dirty="0" smtClean="0"/>
-              <a:t>== 0</a:t>
+              <a:t> == 0</a:t>
             </a:r>
             <a:endParaRPr lang="de-DE" dirty="0"/>
           </a:p>
@@ -12313,11 +12392,7 @@
             </a:r>
             <a:r>
               <a:rPr lang="de-DE" dirty="0" smtClean="0"/>
-              <a:t> == </a:t>
-            </a:r>
-            <a:r>
-              <a:rPr lang="de-DE" dirty="0" smtClean="0"/>
-              <a:t>100</a:t>
+              <a:t> == 100</a:t>
             </a:r>
             <a:endParaRPr lang="de-DE" dirty="0"/>
           </a:p>
@@ -12389,11 +12464,7 @@
             </a:r>
             <a:r>
               <a:rPr lang="de-DE" dirty="0" smtClean="0"/>
-              <a:t> == </a:t>
-            </a:r>
-            <a:r>
-              <a:rPr lang="de-DE" dirty="0" smtClean="0"/>
-              <a:t>250</a:t>
+              <a:t> == 250</a:t>
             </a:r>
             <a:endParaRPr lang="de-DE" dirty="0"/>
           </a:p>
@@ -13978,11 +14049,7 @@
           <a:p>
             <a:r>
               <a:rPr lang="de-DE" dirty="0" smtClean="0"/>
-              <a:t>Konzepte </a:t>
-            </a:r>
-            <a:r>
-              <a:rPr lang="de-DE" dirty="0" smtClean="0"/>
-              <a:t>/ Live </a:t>
+              <a:t>Konzepte / Live </a:t>
             </a:r>
             <a:r>
               <a:rPr lang="de-DE" dirty="0" err="1" smtClean="0"/>
@@ -14013,11 +14080,7 @@
             <a:pPr lvl="1"/>
             <a:r>
               <a:rPr lang="de-DE" dirty="0" smtClean="0"/>
-              <a:t>Trennung GUI / </a:t>
-            </a:r>
-            <a:r>
-              <a:rPr lang="de-DE" dirty="0" smtClean="0"/>
-              <a:t>Implementierung</a:t>
+              <a:t>Trennung GUI / Implementierung</a:t>
             </a:r>
           </a:p>
           <a:p>
@@ -15153,7 +15216,7 @@
           <p:nvPr/>
         </p:nvPicPr>
         <p:blipFill>
-          <a:blip r:embed="rId2" cstate="email">
+          <a:blip r:embed="rId3" cstate="email">
             <a:extLst>
               <a:ext uri="{28A0092B-C50C-407E-A947-70E740481C1C}">
                 <a14:useLocalDpi xmlns:a14="http://schemas.microsoft.com/office/drawing/2010/main" val="0"/>
@@ -15183,7 +15246,7 @@
           <p:nvPr/>
         </p:nvPicPr>
         <p:blipFill>
-          <a:blip r:embed="rId3" cstate="email">
+          <a:blip r:embed="rId4" cstate="email">
             <a:extLst>
               <a:ext uri="{28A0092B-C50C-407E-A947-70E740481C1C}">
                 <a14:useLocalDpi xmlns:a14="http://schemas.microsoft.com/office/drawing/2010/main" val="0"/>
@@ -15213,7 +15276,7 @@
           <p:nvPr/>
         </p:nvPicPr>
         <p:blipFill>
-          <a:blip r:embed="rId4" cstate="email">
+          <a:blip r:embed="rId5" cstate="email">
             <a:extLst>
               <a:ext uri="{28A0092B-C50C-407E-A947-70E740481C1C}">
                 <a14:useLocalDpi xmlns:a14="http://schemas.microsoft.com/office/drawing/2010/main" val="0"/>
@@ -15367,7 +15430,7 @@
           <p:nvPr/>
         </p:nvPicPr>
         <p:blipFill>
-          <a:blip r:embed="rId5" cstate="email">
+          <a:blip r:embed="rId6" cstate="email">
             <a:extLst>
               <a:ext uri="{28A0092B-C50C-407E-A947-70E740481C1C}">
                 <a14:useLocalDpi xmlns:a14="http://schemas.microsoft.com/office/drawing/2010/main" val="0"/>
@@ -15408,7 +15471,7 @@
           <p:nvPr/>
         </p:nvPicPr>
         <p:blipFill>
-          <a:blip r:embed="rId6" cstate="email">
+          <a:blip r:embed="rId7" cstate="email">
             <a:extLst>
               <a:ext uri="{28A0092B-C50C-407E-A947-70E740481C1C}">
                 <a14:useLocalDpi xmlns:a14="http://schemas.microsoft.com/office/drawing/2010/main" val="0"/>
@@ -15449,7 +15512,7 @@
           <p:nvPr/>
         </p:nvPicPr>
         <p:blipFill>
-          <a:blip r:embed="rId7" cstate="email">
+          <a:blip r:embed="rId8" cstate="email">
             <a:extLst>
               <a:ext uri="{28A0092B-C50C-407E-A947-70E740481C1C}">
                 <a14:useLocalDpi xmlns:a14="http://schemas.microsoft.com/office/drawing/2010/main" val="0"/>
@@ -15490,7 +15553,7 @@
           <p:nvPr/>
         </p:nvPicPr>
         <p:blipFill>
-          <a:blip r:embed="rId8" cstate="email">
+          <a:blip r:embed="rId9" cstate="email">
             <a:extLst>
               <a:ext uri="{28A0092B-C50C-407E-A947-70E740481C1C}">
                 <a14:useLocalDpi xmlns:a14="http://schemas.microsoft.com/office/drawing/2010/main" val="0"/>
@@ -15850,6 +15913,801 @@
           <a:chExt cx="0" cy="0"/>
         </a:xfrm>
       </p:grpSpPr>
+      <p:pic>
+        <p:nvPicPr>
+          <p:cNvPr id="5" name="Grafik 4"/>
+          <p:cNvPicPr>
+            <a:picLocks noChangeAspect="1"/>
+          </p:cNvPicPr>
+          <p:nvPr/>
+        </p:nvPicPr>
+        <p:blipFill>
+          <a:blip r:embed="rId3" cstate="email">
+            <a:extLst>
+              <a:ext uri="{28A0092B-C50C-407E-A947-70E740481C1C}">
+                <a14:useLocalDpi xmlns:a14="http://schemas.microsoft.com/office/drawing/2010/main" val="0"/>
+              </a:ext>
+            </a:extLst>
+          </a:blip>
+          <a:stretch>
+            <a:fillRect/>
+          </a:stretch>
+        </p:blipFill>
+        <p:spPr>
+          <a:xfrm>
+            <a:off x="3985169" y="2016915"/>
+            <a:ext cx="633449" cy="452681"/>
+          </a:xfrm>
+          <a:prstGeom prst="rect">
+            <a:avLst/>
+          </a:prstGeom>
+        </p:spPr>
+      </p:pic>
+      <p:sp>
+        <p:nvSpPr>
+          <p:cNvPr id="2" name="Titel 1"/>
+          <p:cNvSpPr>
+            <a:spLocks noGrp="1"/>
+          </p:cNvSpPr>
+          <p:nvPr>
+            <p:ph type="title"/>
+          </p:nvPr>
+        </p:nvSpPr>
+        <p:spPr/>
+        <p:txBody>
+          <a:bodyPr/>
+          <a:lstStyle/>
+          <a:p>
+            <a:r>
+              <a:rPr lang="de-DE" dirty="0" smtClean="0"/>
+              <a:t>Einsatzmöglichkeiten</a:t>
+            </a:r>
+            <a:endParaRPr lang="de-DE" dirty="0"/>
+          </a:p>
+        </p:txBody>
+      </p:sp>
+      <p:sp>
+        <p:nvSpPr>
+          <p:cNvPr id="4" name="Textplatzhalter 10"/>
+          <p:cNvSpPr>
+            <a:spLocks noGrp="1"/>
+          </p:cNvSpPr>
+          <p:nvPr>
+            <p:ph type="body" sz="quarter" idx="12"/>
+          </p:nvPr>
+        </p:nvSpPr>
+        <p:spPr>
+          <a:xfrm>
+            <a:off x="456826" y="696177"/>
+            <a:ext cx="6508750" cy="727075"/>
+          </a:xfrm>
+        </p:spPr>
+        <p:txBody>
+          <a:bodyPr>
+            <a:noAutofit/>
+          </a:bodyPr>
+          <a:lstStyle>
+            <a:lvl1pPr marL="0" indent="0">
+              <a:buNone/>
+              <a:defRPr sz="4400"/>
+            </a:lvl1pPr>
+          </a:lstStyle>
+          <a:p>
+            <a:pPr lvl="0"/>
+            <a:r>
+              <a:rPr lang="de-DE" dirty="0" smtClean="0">
+                <a:solidFill>
+                  <a:schemeClr val="bg2"/>
+                </a:solidFill>
+              </a:rPr>
+              <a:t>Einführung</a:t>
+            </a:r>
+            <a:endParaRPr lang="de-DE" dirty="0">
+              <a:solidFill>
+                <a:schemeClr val="bg2"/>
+              </a:solidFill>
+            </a:endParaRPr>
+          </a:p>
+        </p:txBody>
+      </p:sp>
+      <p:pic>
+        <p:nvPicPr>
+          <p:cNvPr id="1026" name="Picture 2" descr="http://files.softicons.com/download/system-icons/phuzion-icons-by-kyo-tux/png/256/Windows.png"/>
+          <p:cNvPicPr>
+            <a:picLocks noChangeAspect="1" noChangeArrowheads="1"/>
+          </p:cNvPicPr>
+          <p:nvPr/>
+        </p:nvPicPr>
+        <p:blipFill>
+          <a:blip r:embed="rId4" cstate="email">
+            <a:extLst>
+              <a:ext uri="{28A0092B-C50C-407E-A947-70E740481C1C}">
+                <a14:useLocalDpi xmlns:a14="http://schemas.microsoft.com/office/drawing/2010/main" val="0"/>
+              </a:ext>
+            </a:extLst>
+          </a:blip>
+          <a:srcRect/>
+          <a:stretch>
+            <a:fillRect/>
+          </a:stretch>
+        </p:blipFill>
+        <p:spPr bwMode="auto">
+          <a:xfrm>
+            <a:off x="1765011" y="3907509"/>
+            <a:ext cx="1107586" cy="1107586"/>
+          </a:xfrm>
+          <a:prstGeom prst="rect">
+            <a:avLst/>
+          </a:prstGeom>
+          <a:noFill/>
+          <a:extLst>
+            <a:ext uri="{909E8E84-426E-40DD-AFC4-6F175D3DCCD1}">
+              <a14:hiddenFill xmlns:a14="http://schemas.microsoft.com/office/drawing/2010/main">
+                <a:solidFill>
+                  <a:srgbClr val="FFFFFF"/>
+                </a:solidFill>
+              </a14:hiddenFill>
+            </a:ext>
+          </a:extLst>
+        </p:spPr>
+      </p:pic>
+      <p:pic>
+        <p:nvPicPr>
+          <p:cNvPr id="1028" name="Picture 4" descr="http://1.bp.blogspot.com/-QAvdSEh9G0Q/TZEutMh_BFI/AAAAAAAAAMc/ezrXzXHX6dM/s1600/mac.png"/>
+          <p:cNvPicPr>
+            <a:picLocks noChangeAspect="1" noChangeArrowheads="1"/>
+          </p:cNvPicPr>
+          <p:nvPr/>
+        </p:nvPicPr>
+        <p:blipFill>
+          <a:blip r:embed="rId5" cstate="email">
+            <a:extLst>
+              <a:ext uri="{28A0092B-C50C-407E-A947-70E740481C1C}">
+                <a14:useLocalDpi xmlns:a14="http://schemas.microsoft.com/office/drawing/2010/main" val="0"/>
+              </a:ext>
+            </a:extLst>
+          </a:blip>
+          <a:srcRect/>
+          <a:stretch>
+            <a:fillRect/>
+          </a:stretch>
+        </p:blipFill>
+        <p:spPr bwMode="auto">
+          <a:xfrm>
+            <a:off x="5644052" y="3783225"/>
+            <a:ext cx="924909" cy="1082071"/>
+          </a:xfrm>
+          <a:prstGeom prst="rect">
+            <a:avLst/>
+          </a:prstGeom>
+          <a:noFill/>
+          <a:extLst>
+            <a:ext uri="{909E8E84-426E-40DD-AFC4-6F175D3DCCD1}">
+              <a14:hiddenFill xmlns:a14="http://schemas.microsoft.com/office/drawing/2010/main">
+                <a:solidFill>
+                  <a:srgbClr val="FFFFFF"/>
+                </a:solidFill>
+              </a14:hiddenFill>
+            </a:ext>
+          </a:extLst>
+        </p:spPr>
+      </p:pic>
+      <p:pic>
+        <p:nvPicPr>
+          <p:cNvPr id="1030" name="Picture 6" descr="http://getfile9.posterous.com/getfile/files.posterous.com/temp-2010-06-17/tialljHdrkatAIavItaEkgAHFzGytbvcfvzEsBGckEIAcCqdjjHyjcgfldgy/browser-logo-major.png.scaled500.png"/>
+          <p:cNvPicPr>
+            <a:picLocks noChangeAspect="1" noChangeArrowheads="1"/>
+          </p:cNvPicPr>
+          <p:nvPr/>
+        </p:nvPicPr>
+        <p:blipFill>
+          <a:blip r:embed="rId6" cstate="email">
+            <a:extLst>
+              <a:ext uri="{28A0092B-C50C-407E-A947-70E740481C1C}">
+                <a14:useLocalDpi xmlns:a14="http://schemas.microsoft.com/office/drawing/2010/main" val="0"/>
+              </a:ext>
+            </a:extLst>
+          </a:blip>
+          <a:srcRect/>
+          <a:stretch>
+            <a:fillRect/>
+          </a:stretch>
+        </p:blipFill>
+        <p:spPr bwMode="auto">
+          <a:xfrm>
+            <a:off x="3501421" y="5331024"/>
+            <a:ext cx="1629388" cy="1162273"/>
+          </a:xfrm>
+          <a:prstGeom prst="rect">
+            <a:avLst/>
+          </a:prstGeom>
+          <a:noFill/>
+          <a:extLst>
+            <a:ext uri="{909E8E84-426E-40DD-AFC4-6F175D3DCCD1}">
+              <a14:hiddenFill xmlns:a14="http://schemas.microsoft.com/office/drawing/2010/main">
+                <a:solidFill>
+                  <a:srgbClr val="FFFFFF"/>
+                </a:solidFill>
+              </a14:hiddenFill>
+            </a:ext>
+          </a:extLst>
+        </p:spPr>
+      </p:pic>
+      <p:grpSp>
+        <p:nvGrpSpPr>
+          <p:cNvPr id="10" name="Gruppieren 9"/>
+          <p:cNvGrpSpPr/>
+          <p:nvPr/>
+        </p:nvGrpSpPr>
+        <p:grpSpPr>
+          <a:xfrm>
+            <a:off x="3376755" y="2440142"/>
+            <a:ext cx="1890981" cy="1124799"/>
+            <a:chOff x="3440998" y="4976579"/>
+            <a:chExt cx="1890981" cy="1124799"/>
+          </a:xfrm>
+        </p:grpSpPr>
+        <p:grpSp>
+          <p:nvGrpSpPr>
+            <p:cNvPr id="8" name="Gruppieren 7"/>
+            <p:cNvGrpSpPr/>
+            <p:nvPr/>
+          </p:nvGrpSpPr>
+          <p:grpSpPr>
+            <a:xfrm>
+              <a:off x="3440998" y="4976579"/>
+              <a:ext cx="1890981" cy="1124799"/>
+              <a:chOff x="3408938" y="5049426"/>
+              <a:chExt cx="1890981" cy="1124799"/>
+            </a:xfrm>
+          </p:grpSpPr>
+          <p:sp>
+            <p:nvSpPr>
+              <p:cNvPr id="6" name="Ellipse 5"/>
+              <p:cNvSpPr/>
+              <p:nvPr/>
+            </p:nvSpPr>
+            <p:spPr>
+              <a:xfrm>
+                <a:off x="3408938" y="5049426"/>
+                <a:ext cx="1800076" cy="1001969"/>
+              </a:xfrm>
+              <a:prstGeom prst="ellipse">
+                <a:avLst/>
+              </a:prstGeom>
+              <a:ln w="3175"/>
+            </p:spPr>
+            <p:style>
+              <a:lnRef idx="2">
+                <a:schemeClr val="accent5"/>
+              </a:lnRef>
+              <a:fillRef idx="1">
+                <a:schemeClr val="lt1"/>
+              </a:fillRef>
+              <a:effectRef idx="0">
+                <a:schemeClr val="accent5"/>
+              </a:effectRef>
+              <a:fontRef idx="minor">
+                <a:schemeClr val="dk1"/>
+              </a:fontRef>
+            </p:style>
+            <p:txBody>
+              <a:bodyPr rtlCol="0" anchor="ctr"/>
+              <a:lstStyle/>
+              <a:p>
+                <a:pPr algn="ctr"/>
+                <a:endParaRPr lang="de-DE" dirty="0"/>
+              </a:p>
+            </p:txBody>
+          </p:sp>
+          <p:pic>
+            <p:nvPicPr>
+              <p:cNvPr id="1036" name="Picture 12" descr="http://www.stealth-commando.de/images/news-pics/42_1305842338png"/>
+              <p:cNvPicPr>
+                <a:picLocks noChangeAspect="1" noChangeArrowheads="1"/>
+              </p:cNvPicPr>
+              <p:nvPr/>
+            </p:nvPicPr>
+            <p:blipFill>
+              <a:blip r:embed="rId7" cstate="email">
+                <a:extLst>
+                  <a:ext uri="{28A0092B-C50C-407E-A947-70E740481C1C}">
+                    <a14:useLocalDpi xmlns:a14="http://schemas.microsoft.com/office/drawing/2010/main" val="0"/>
+                  </a:ext>
+                </a:extLst>
+              </a:blip>
+              <a:srcRect/>
+              <a:stretch>
+                <a:fillRect/>
+              </a:stretch>
+            </p:blipFill>
+            <p:spPr bwMode="auto">
+              <a:xfrm>
+                <a:off x="4195949" y="5070255"/>
+                <a:ext cx="1103970" cy="1103970"/>
+              </a:xfrm>
+              <a:prstGeom prst="rect">
+                <a:avLst/>
+              </a:prstGeom>
+              <a:noFill/>
+              <a:extLst>
+                <a:ext uri="{909E8E84-426E-40DD-AFC4-6F175D3DCCD1}">
+                  <a14:hiddenFill xmlns:a14="http://schemas.microsoft.com/office/drawing/2010/main">
+                    <a:solidFill>
+                      <a:srgbClr val="FFFFFF"/>
+                    </a:solidFill>
+                  </a14:hiddenFill>
+                </a:ext>
+              </a:extLst>
+            </p:spPr>
+          </p:pic>
+          <p:pic>
+            <p:nvPicPr>
+              <p:cNvPr id="1042" name="Picture 18" descr="http://www.heredis.com/wp-content/themes/heredis/iphone/ios.png"/>
+              <p:cNvPicPr>
+                <a:picLocks noChangeAspect="1" noChangeArrowheads="1"/>
+              </p:cNvPicPr>
+              <p:nvPr/>
+            </p:nvPicPr>
+            <p:blipFill>
+              <a:blip r:embed="rId8" cstate="email">
+                <a:extLst>
+                  <a:ext uri="{28A0092B-C50C-407E-A947-70E740481C1C}">
+                    <a14:useLocalDpi xmlns:a14="http://schemas.microsoft.com/office/drawing/2010/main" val="0"/>
+                  </a:ext>
+                </a:extLst>
+              </a:blip>
+              <a:srcRect/>
+              <a:stretch>
+                <a:fillRect/>
+              </a:stretch>
+            </p:blipFill>
+            <p:spPr bwMode="auto">
+              <a:xfrm>
+                <a:off x="3619657" y="5392947"/>
+                <a:ext cx="812645" cy="551985"/>
+              </a:xfrm>
+              <a:prstGeom prst="rect">
+                <a:avLst/>
+              </a:prstGeom>
+              <a:noFill/>
+              <a:extLst>
+                <a:ext uri="{909E8E84-426E-40DD-AFC4-6F175D3DCCD1}">
+                  <a14:hiddenFill xmlns:a14="http://schemas.microsoft.com/office/drawing/2010/main">
+                    <a:solidFill>
+                      <a:srgbClr val="FFFFFF"/>
+                    </a:solidFill>
+                  </a14:hiddenFill>
+                </a:ext>
+              </a:extLst>
+            </p:spPr>
+          </p:pic>
+        </p:grpSp>
+        <p:sp>
+          <p:nvSpPr>
+            <p:cNvPr id="9" name="Textfeld 8"/>
+            <p:cNvSpPr txBox="1"/>
+            <p:nvPr/>
+          </p:nvSpPr>
+          <p:spPr>
+            <a:xfrm>
+              <a:off x="4240957" y="4977423"/>
+              <a:ext cx="248786" cy="369332"/>
+            </a:xfrm>
+            <a:prstGeom prst="rect">
+              <a:avLst/>
+            </a:prstGeom>
+            <a:noFill/>
+          </p:spPr>
+          <p:txBody>
+            <a:bodyPr wrap="none" rtlCol="0">
+              <a:spAutoFit/>
+            </a:bodyPr>
+            <a:lstStyle/>
+            <a:p>
+              <a:r>
+                <a:rPr lang="de-DE" dirty="0">
+                  <a:solidFill>
+                    <a:schemeClr val="tx2">
+                      <a:lumMod val="20000"/>
+                      <a:lumOff val="80000"/>
+                    </a:schemeClr>
+                  </a:solidFill>
+                  <a:effectLst>
+                    <a:outerShdw blurRad="38100" dist="38100" dir="2700000" algn="tl">
+                      <a:srgbClr val="000000">
+                        <a:alpha val="43137"/>
+                      </a:srgbClr>
+                    </a:outerShdw>
+                  </a:effectLst>
+                  <a:latin typeface="Helvetica" pitchFamily="34" charset="0"/>
+                </a:rPr>
+                <a:t>!</a:t>
+              </a:r>
+            </a:p>
+          </p:txBody>
+        </p:sp>
+      </p:grpSp>
+      <p:pic>
+        <p:nvPicPr>
+          <p:cNvPr id="3" name="Grafik 2"/>
+          <p:cNvPicPr>
+            <a:picLocks noChangeAspect="1"/>
+          </p:cNvPicPr>
+          <p:nvPr/>
+        </p:nvPicPr>
+        <p:blipFill>
+          <a:blip r:embed="rId9" cstate="email">
+            <a:extLst>
+              <a:ext uri="{28A0092B-C50C-407E-A947-70E740481C1C}">
+                <a14:useLocalDpi xmlns:a14="http://schemas.microsoft.com/office/drawing/2010/main" val="0"/>
+              </a:ext>
+            </a:extLst>
+          </a:blip>
+          <a:stretch>
+            <a:fillRect/>
+          </a:stretch>
+        </p:blipFill>
+        <p:spPr>
+          <a:xfrm>
+            <a:off x="3915290" y="3917891"/>
+            <a:ext cx="801651" cy="947405"/>
+          </a:xfrm>
+          <a:prstGeom prst="rect">
+            <a:avLst/>
+          </a:prstGeom>
+        </p:spPr>
+      </p:pic>
+    </p:spTree>
+    <p:extLst>
+      <p:ext uri="{BB962C8B-B14F-4D97-AF65-F5344CB8AC3E}">
+        <p14:creationId xmlns:p14="http://schemas.microsoft.com/office/powerpoint/2010/main" val="3872441007"/>
+      </p:ext>
+    </p:extLst>
+  </p:cSld>
+  <p:clrMapOvr>
+    <a:masterClrMapping/>
+  </p:clrMapOvr>
+  <mc:AlternateContent xmlns:mc="http://schemas.openxmlformats.org/markup-compatibility/2006" xmlns:p14="http://schemas.microsoft.com/office/powerpoint/2010/main">
+    <mc:Choice Requires="p14">
+      <p:transition spd="slow" p14:dur="2000"/>
+    </mc:Choice>
+    <mc:Fallback xmlns="">
+      <p:transition spd="slow"/>
+    </mc:Fallback>
+  </mc:AlternateContent>
+  <p:timing>
+    <p:tnLst>
+      <p:par>
+        <p:cTn id="1" dur="indefinite" restart="never" nodeType="tmRoot">
+          <p:childTnLst>
+            <p:seq concurrent="1" nextAc="seek">
+              <p:cTn id="2" dur="indefinite" nodeType="mainSeq">
+                <p:childTnLst>
+                  <p:par>
+                    <p:cTn id="3" fill="hold">
+                      <p:stCondLst>
+                        <p:cond delay="indefinite"/>
+                      </p:stCondLst>
+                      <p:childTnLst>
+                        <p:par>
+                          <p:cTn id="4" fill="hold">
+                            <p:stCondLst>
+                              <p:cond delay="0"/>
+                            </p:stCondLst>
+                            <p:childTnLst>
+                              <p:par>
+                                <p:cTn id="5" presetID="10" presetClass="entr" presetSubtype="0" fill="hold" nodeType="clickEffect">
+                                  <p:stCondLst>
+                                    <p:cond delay="0"/>
+                                  </p:stCondLst>
+                                  <p:childTnLst>
+                                    <p:set>
+                                      <p:cBhvr>
+                                        <p:cTn id="6" dur="1" fill="hold">
+                                          <p:stCondLst>
+                                            <p:cond delay="0"/>
+                                          </p:stCondLst>
+                                        </p:cTn>
+                                        <p:tgtEl>
+                                          <p:spTgt spid="1026"/>
+                                        </p:tgtEl>
+                                        <p:attrNameLst>
+                                          <p:attrName>style.visibility</p:attrName>
+                                        </p:attrNameLst>
+                                      </p:cBhvr>
+                                      <p:to>
+                                        <p:strVal val="visible"/>
+                                      </p:to>
+                                    </p:set>
+                                    <p:animEffect transition="in" filter="fade">
+                                      <p:cBhvr>
+                                        <p:cTn id="7" dur="500"/>
+                                        <p:tgtEl>
+                                          <p:spTgt spid="1026"/>
+                                        </p:tgtEl>
+                                      </p:cBhvr>
+                                    </p:animEffect>
+                                  </p:childTnLst>
+                                </p:cTn>
+                              </p:par>
+                              <p:par>
+                                <p:cTn id="8" presetID="10" presetClass="entr" presetSubtype="0" fill="hold" nodeType="withEffect">
+                                  <p:stCondLst>
+                                    <p:cond delay="0"/>
+                                  </p:stCondLst>
+                                  <p:childTnLst>
+                                    <p:set>
+                                      <p:cBhvr>
+                                        <p:cTn id="9" dur="1" fill="hold">
+                                          <p:stCondLst>
+                                            <p:cond delay="0"/>
+                                          </p:stCondLst>
+                                        </p:cTn>
+                                        <p:tgtEl>
+                                          <p:spTgt spid="3"/>
+                                        </p:tgtEl>
+                                        <p:attrNameLst>
+                                          <p:attrName>style.visibility</p:attrName>
+                                        </p:attrNameLst>
+                                      </p:cBhvr>
+                                      <p:to>
+                                        <p:strVal val="visible"/>
+                                      </p:to>
+                                    </p:set>
+                                    <p:animEffect transition="in" filter="fade">
+                                      <p:cBhvr>
+                                        <p:cTn id="10" dur="500"/>
+                                        <p:tgtEl>
+                                          <p:spTgt spid="3"/>
+                                        </p:tgtEl>
+                                      </p:cBhvr>
+                                    </p:animEffect>
+                                  </p:childTnLst>
+                                </p:cTn>
+                              </p:par>
+                              <p:par>
+                                <p:cTn id="11" presetID="10" presetClass="entr" presetSubtype="0" fill="hold" nodeType="withEffect">
+                                  <p:stCondLst>
+                                    <p:cond delay="0"/>
+                                  </p:stCondLst>
+                                  <p:childTnLst>
+                                    <p:set>
+                                      <p:cBhvr>
+                                        <p:cTn id="12" dur="1" fill="hold">
+                                          <p:stCondLst>
+                                            <p:cond delay="0"/>
+                                          </p:stCondLst>
+                                        </p:cTn>
+                                        <p:tgtEl>
+                                          <p:spTgt spid="1028"/>
+                                        </p:tgtEl>
+                                        <p:attrNameLst>
+                                          <p:attrName>style.visibility</p:attrName>
+                                        </p:attrNameLst>
+                                      </p:cBhvr>
+                                      <p:to>
+                                        <p:strVal val="visible"/>
+                                      </p:to>
+                                    </p:set>
+                                    <p:animEffect transition="in" filter="fade">
+                                      <p:cBhvr>
+                                        <p:cTn id="13" dur="500"/>
+                                        <p:tgtEl>
+                                          <p:spTgt spid="1028"/>
+                                        </p:tgtEl>
+                                      </p:cBhvr>
+                                    </p:animEffect>
+                                  </p:childTnLst>
+                                </p:cTn>
+                              </p:par>
+                            </p:childTnLst>
+                          </p:cTn>
+                        </p:par>
+                      </p:childTnLst>
+                    </p:cTn>
+                  </p:par>
+                  <p:par>
+                    <p:cTn id="14" fill="hold">
+                      <p:stCondLst>
+                        <p:cond delay="indefinite"/>
+                      </p:stCondLst>
+                      <p:childTnLst>
+                        <p:par>
+                          <p:cTn id="15" fill="hold">
+                            <p:stCondLst>
+                              <p:cond delay="0"/>
+                            </p:stCondLst>
+                            <p:childTnLst>
+                              <p:par>
+                                <p:cTn id="16" presetID="10" presetClass="entr" presetSubtype="0" fill="hold" nodeType="clickEffect">
+                                  <p:stCondLst>
+                                    <p:cond delay="0"/>
+                                  </p:stCondLst>
+                                  <p:childTnLst>
+                                    <p:set>
+                                      <p:cBhvr>
+                                        <p:cTn id="17" dur="1" fill="hold">
+                                          <p:stCondLst>
+                                            <p:cond delay="0"/>
+                                          </p:stCondLst>
+                                        </p:cTn>
+                                        <p:tgtEl>
+                                          <p:spTgt spid="1030"/>
+                                        </p:tgtEl>
+                                        <p:attrNameLst>
+                                          <p:attrName>style.visibility</p:attrName>
+                                        </p:attrNameLst>
+                                      </p:cBhvr>
+                                      <p:to>
+                                        <p:strVal val="visible"/>
+                                      </p:to>
+                                    </p:set>
+                                    <p:animEffect transition="in" filter="fade">
+                                      <p:cBhvr>
+                                        <p:cTn id="18" dur="500"/>
+                                        <p:tgtEl>
+                                          <p:spTgt spid="1030"/>
+                                        </p:tgtEl>
+                                      </p:cBhvr>
+                                    </p:animEffect>
+                                  </p:childTnLst>
+                                </p:cTn>
+                              </p:par>
+                            </p:childTnLst>
+                          </p:cTn>
+                        </p:par>
+                      </p:childTnLst>
+                    </p:cTn>
+                  </p:par>
+                  <p:par>
+                    <p:cTn id="19" fill="hold">
+                      <p:stCondLst>
+                        <p:cond delay="indefinite"/>
+                      </p:stCondLst>
+                      <p:childTnLst>
+                        <p:par>
+                          <p:cTn id="20" fill="hold">
+                            <p:stCondLst>
+                              <p:cond delay="0"/>
+                            </p:stCondLst>
+                            <p:childTnLst>
+                              <p:par>
+                                <p:cTn id="21" presetID="10" presetClass="entr" presetSubtype="0" fill="hold" nodeType="clickEffect">
+                                  <p:stCondLst>
+                                    <p:cond delay="0"/>
+                                  </p:stCondLst>
+                                  <p:childTnLst>
+                                    <p:set>
+                                      <p:cBhvr>
+                                        <p:cTn id="22" dur="1" fill="hold">
+                                          <p:stCondLst>
+                                            <p:cond delay="0"/>
+                                          </p:stCondLst>
+                                        </p:cTn>
+                                        <p:tgtEl>
+                                          <p:spTgt spid="10"/>
+                                        </p:tgtEl>
+                                        <p:attrNameLst>
+                                          <p:attrName>style.visibility</p:attrName>
+                                        </p:attrNameLst>
+                                      </p:cBhvr>
+                                      <p:to>
+                                        <p:strVal val="visible"/>
+                                      </p:to>
+                                    </p:set>
+                                    <p:animEffect transition="in" filter="fade">
+                                      <p:cBhvr>
+                                        <p:cTn id="23" dur="500"/>
+                                        <p:tgtEl>
+                                          <p:spTgt spid="10"/>
+                                        </p:tgtEl>
+                                      </p:cBhvr>
+                                    </p:animEffect>
+                                  </p:childTnLst>
+                                </p:cTn>
+                              </p:par>
+                            </p:childTnLst>
+                          </p:cTn>
+                        </p:par>
+                      </p:childTnLst>
+                    </p:cTn>
+                  </p:par>
+                  <p:par>
+                    <p:cTn id="24" fill="hold">
+                      <p:stCondLst>
+                        <p:cond delay="indefinite"/>
+                      </p:stCondLst>
+                      <p:childTnLst>
+                        <p:par>
+                          <p:cTn id="25" fill="hold">
+                            <p:stCondLst>
+                              <p:cond delay="0"/>
+                            </p:stCondLst>
+                            <p:childTnLst>
+                              <p:par>
+                                <p:cTn id="26" presetID="10" presetClass="entr" presetSubtype="0" fill="hold" nodeType="clickEffect">
+                                  <p:stCondLst>
+                                    <p:cond delay="0"/>
+                                  </p:stCondLst>
+                                  <p:childTnLst>
+                                    <p:set>
+                                      <p:cBhvr>
+                                        <p:cTn id="27" dur="1" fill="hold">
+                                          <p:stCondLst>
+                                            <p:cond delay="0"/>
+                                          </p:stCondLst>
+                                        </p:cTn>
+                                        <p:tgtEl>
+                                          <p:spTgt spid="5"/>
+                                        </p:tgtEl>
+                                        <p:attrNameLst>
+                                          <p:attrName>style.visibility</p:attrName>
+                                        </p:attrNameLst>
+                                      </p:cBhvr>
+                                      <p:to>
+                                        <p:strVal val="visible"/>
+                                      </p:to>
+                                    </p:set>
+                                    <p:animEffect transition="in" filter="fade">
+                                      <p:cBhvr>
+                                        <p:cTn id="28" dur="500"/>
+                                        <p:tgtEl>
+                                          <p:spTgt spid="5"/>
+                                        </p:tgtEl>
+                                      </p:cBhvr>
+                                    </p:animEffect>
+                                  </p:childTnLst>
+                                </p:cTn>
+                              </p:par>
+                            </p:childTnLst>
+                          </p:cTn>
+                        </p:par>
+                      </p:childTnLst>
+                    </p:cTn>
+                  </p:par>
+                </p:childTnLst>
+              </p:cTn>
+              <p:prevCondLst>
+                <p:cond evt="onPrev" delay="0">
+                  <p:tgtEl>
+                    <p:sldTgt/>
+                  </p:tgtEl>
+                </p:cond>
+              </p:prevCondLst>
+              <p:nextCondLst>
+                <p:cond evt="onNext" delay="0">
+                  <p:tgtEl>
+                    <p:sldTgt/>
+                  </p:tgtEl>
+                </p:cond>
+              </p:nextCondLst>
+            </p:seq>
+          </p:childTnLst>
+        </p:cTn>
+      </p:par>
+    </p:tnLst>
+  </p:timing>
+</p:sld>
+</file>
+
+<file path=ppt/slides/slide6.xml><?xml version="1.0" encoding="utf-8"?>
+<p:sld xmlns:a="http://schemas.openxmlformats.org/drawingml/2006/main" xmlns:r="http://schemas.openxmlformats.org/officeDocument/2006/relationships" xmlns:p="http://schemas.openxmlformats.org/presentationml/2006/main">
+  <p:cSld>
+    <p:spTree>
+      <p:nvGrpSpPr>
+        <p:cNvPr id="1" name=""/>
+        <p:cNvGrpSpPr/>
+        <p:nvPr/>
+      </p:nvGrpSpPr>
+      <p:grpSpPr>
+        <a:xfrm>
+          <a:off x="0" y="0"/>
+          <a:ext cx="0" cy="0"/>
+          <a:chOff x="0" y="0"/>
+          <a:chExt cx="0" cy="0"/>
+        </a:xfrm>
+      </p:grpSpPr>
       <p:sp>
         <p:nvSpPr>
           <p:cNvPr id="2" name="Titel 1"/>
@@ -15905,11 +16763,7 @@
           <a:p>
             <a:r>
               <a:rPr lang="de-DE" dirty="0" smtClean="0"/>
-              <a:t>Properties </a:t>
-            </a:r>
-            <a:r>
-              <a:rPr lang="de-DE" dirty="0" smtClean="0"/>
-              <a:t>/ </a:t>
+              <a:t>Properties / </a:t>
             </a:r>
             <a:r>
               <a:rPr lang="de-DE" dirty="0" err="1" smtClean="0"/>
@@ -16612,97 +17466,6 @@
 </p:sld>
 </file>
 
-<file path=ppt/slides/slide6.xml><?xml version="1.0" encoding="utf-8"?>
-<p:sld xmlns:a="http://schemas.openxmlformats.org/drawingml/2006/main" xmlns:r="http://schemas.openxmlformats.org/officeDocument/2006/relationships" xmlns:p="http://schemas.openxmlformats.org/presentationml/2006/main">
-  <p:cSld>
-    <p:spTree>
-      <p:nvGrpSpPr>
-        <p:cNvPr id="1" name=""/>
-        <p:cNvGrpSpPr/>
-        <p:nvPr/>
-      </p:nvGrpSpPr>
-      <p:grpSpPr>
-        <a:xfrm>
-          <a:off x="0" y="0"/>
-          <a:ext cx="0" cy="0"/>
-          <a:chOff x="0" y="0"/>
-          <a:chExt cx="0" cy="0"/>
-        </a:xfrm>
-      </p:grpSpPr>
-      <p:sp>
-        <p:nvSpPr>
-          <p:cNvPr id="2" name="Titel 1"/>
-          <p:cNvSpPr>
-            <a:spLocks noGrp="1"/>
-          </p:cNvSpPr>
-          <p:nvPr>
-            <p:ph type="title"/>
-          </p:nvPr>
-        </p:nvSpPr>
-        <p:spPr/>
-        <p:txBody>
-          <a:bodyPr/>
-          <a:lstStyle/>
-          <a:p>
-            <a:r>
-              <a:rPr lang="de-DE" dirty="0" smtClean="0"/>
-              <a:t>Beispiele</a:t>
-            </a:r>
-            <a:endParaRPr lang="de-DE" dirty="0"/>
-          </a:p>
-        </p:txBody>
-      </p:sp>
-      <p:sp>
-        <p:nvSpPr>
-          <p:cNvPr id="4" name="Textplatzhalter 3"/>
-          <p:cNvSpPr>
-            <a:spLocks noGrp="1"/>
-          </p:cNvSpPr>
-          <p:nvPr>
-            <p:ph type="body" sz="quarter" idx="12"/>
-          </p:nvPr>
-        </p:nvSpPr>
-        <p:spPr/>
-        <p:txBody>
-          <a:bodyPr/>
-          <a:lstStyle/>
-          <a:p>
-            <a:r>
-              <a:rPr lang="de-DE" dirty="0" smtClean="0">
-                <a:solidFill>
-                  <a:schemeClr val="bg2"/>
-                </a:solidFill>
-              </a:rPr>
-              <a:t>Einführung</a:t>
-            </a:r>
-            <a:endParaRPr lang="de-DE" dirty="0">
-              <a:solidFill>
-                <a:schemeClr val="bg2"/>
-              </a:solidFill>
-            </a:endParaRPr>
-          </a:p>
-        </p:txBody>
-      </p:sp>
-    </p:spTree>
-    <p:extLst>
-      <p:ext uri="{BB962C8B-B14F-4D97-AF65-F5344CB8AC3E}">
-        <p14:creationId xmlns:p14="http://schemas.microsoft.com/office/powerpoint/2010/main" val="1449198465"/>
-      </p:ext>
-    </p:extLst>
-  </p:cSld>
-  <p:clrMapOvr>
-    <a:masterClrMapping/>
-  </p:clrMapOvr>
-  <p:timing>
-    <p:tnLst>
-      <p:par>
-        <p:cTn id="1" dur="indefinite" restart="never" nodeType="tmRoot"/>
-      </p:par>
-    </p:tnLst>
-  </p:timing>
-</p:sld>
-</file>
-
 <file path=ppt/slides/slide7.xml><?xml version="1.0" encoding="utf-8"?>
 <p:sld xmlns:a="http://schemas.openxmlformats.org/drawingml/2006/main" xmlns:r="http://schemas.openxmlformats.org/officeDocument/2006/relationships" xmlns:p="http://schemas.openxmlformats.org/presentationml/2006/main">
   <p:cSld>
@@ -16720,36 +17483,6 @@
           <a:chExt cx="0" cy="0"/>
         </a:xfrm>
       </p:grpSpPr>
-      <p:pic>
-        <p:nvPicPr>
-          <p:cNvPr id="5" name="Grafik 4"/>
-          <p:cNvPicPr>
-            <a:picLocks noChangeAspect="1"/>
-          </p:cNvPicPr>
-          <p:nvPr/>
-        </p:nvPicPr>
-        <p:blipFill>
-          <a:blip r:embed="rId3" cstate="email">
-            <a:extLst>
-              <a:ext uri="{28A0092B-C50C-407E-A947-70E740481C1C}">
-                <a14:useLocalDpi xmlns:a14="http://schemas.microsoft.com/office/drawing/2010/main" val="0"/>
-              </a:ext>
-            </a:extLst>
-          </a:blip>
-          <a:stretch>
-            <a:fillRect/>
-          </a:stretch>
-        </p:blipFill>
-        <p:spPr>
-          <a:xfrm>
-            <a:off x="3985169" y="2016915"/>
-            <a:ext cx="633449" cy="452681"/>
-          </a:xfrm>
-          <a:prstGeom prst="rect">
-            <a:avLst/>
-          </a:prstGeom>
-        </p:spPr>
-      </p:pic>
       <p:sp>
         <p:nvSpPr>
           <p:cNvPr id="2" name="Titel 1"/>
@@ -16767,7 +17500,7 @@
           <a:p>
             <a:r>
               <a:rPr lang="de-DE" dirty="0" smtClean="0"/>
-              <a:t>Einsatzmöglichkeiten</a:t>
+              <a:t>Beispiele</a:t>
             </a:r>
             <a:endParaRPr lang="de-DE" dirty="0"/>
           </a:p>
@@ -16775,7 +17508,7 @@
       </p:sp>
       <p:sp>
         <p:nvSpPr>
-          <p:cNvPr id="4" name="Textplatzhalter 10"/>
+          <p:cNvPr id="4" name="Textplatzhalter 3"/>
           <p:cNvSpPr>
             <a:spLocks noGrp="1"/>
           </p:cNvSpPr>
@@ -16783,24 +17516,11 @@
             <p:ph type="body" sz="quarter" idx="12"/>
           </p:nvPr>
         </p:nvSpPr>
-        <p:spPr>
-          <a:xfrm>
-            <a:off x="456826" y="696177"/>
-            <a:ext cx="6508750" cy="727075"/>
-          </a:xfrm>
-        </p:spPr>
-        <p:txBody>
-          <a:bodyPr>
-            <a:noAutofit/>
-          </a:bodyPr>
-          <a:lstStyle>
-            <a:lvl1pPr marL="0" indent="0">
-              <a:buNone/>
-              <a:defRPr sz="4400"/>
-            </a:lvl1pPr>
-          </a:lstStyle>
-          <a:p>
-            <a:pPr lvl="0"/>
+        <p:spPr/>
+        <p:txBody>
+          <a:bodyPr/>
+          <a:lstStyle/>
+          <a:p>
             <a:r>
               <a:rPr lang="de-DE" dirty="0" smtClean="0">
                 <a:solidFill>
@@ -16817,697 +17537,20 @@
           </a:p>
         </p:txBody>
       </p:sp>
-      <p:pic>
-        <p:nvPicPr>
-          <p:cNvPr id="1026" name="Picture 2" descr="http://files.softicons.com/download/system-icons/phuzion-icons-by-kyo-tux/png/256/Windows.png"/>
-          <p:cNvPicPr>
-            <a:picLocks noChangeAspect="1" noChangeArrowheads="1"/>
-          </p:cNvPicPr>
-          <p:nvPr/>
-        </p:nvPicPr>
-        <p:blipFill>
-          <a:blip r:embed="rId4" cstate="email">
-            <a:extLst>
-              <a:ext uri="{28A0092B-C50C-407E-A947-70E740481C1C}">
-                <a14:useLocalDpi xmlns:a14="http://schemas.microsoft.com/office/drawing/2010/main" val="0"/>
-              </a:ext>
-            </a:extLst>
-          </a:blip>
-          <a:srcRect/>
-          <a:stretch>
-            <a:fillRect/>
-          </a:stretch>
-        </p:blipFill>
-        <p:spPr bwMode="auto">
-          <a:xfrm>
-            <a:off x="1765011" y="3907509"/>
-            <a:ext cx="1107586" cy="1107586"/>
-          </a:xfrm>
-          <a:prstGeom prst="rect">
-            <a:avLst/>
-          </a:prstGeom>
-          <a:noFill/>
-          <a:extLst>
-            <a:ext uri="{909E8E84-426E-40DD-AFC4-6F175D3DCCD1}">
-              <a14:hiddenFill xmlns:a14="http://schemas.microsoft.com/office/drawing/2010/main">
-                <a:solidFill>
-                  <a:srgbClr val="FFFFFF"/>
-                </a:solidFill>
-              </a14:hiddenFill>
-            </a:ext>
-          </a:extLst>
-        </p:spPr>
-      </p:pic>
-      <p:pic>
-        <p:nvPicPr>
-          <p:cNvPr id="1028" name="Picture 4" descr="http://1.bp.blogspot.com/-QAvdSEh9G0Q/TZEutMh_BFI/AAAAAAAAAMc/ezrXzXHX6dM/s1600/mac.png"/>
-          <p:cNvPicPr>
-            <a:picLocks noChangeAspect="1" noChangeArrowheads="1"/>
-          </p:cNvPicPr>
-          <p:nvPr/>
-        </p:nvPicPr>
-        <p:blipFill>
-          <a:blip r:embed="rId5" cstate="email">
-            <a:extLst>
-              <a:ext uri="{28A0092B-C50C-407E-A947-70E740481C1C}">
-                <a14:useLocalDpi xmlns:a14="http://schemas.microsoft.com/office/drawing/2010/main" val="0"/>
-              </a:ext>
-            </a:extLst>
-          </a:blip>
-          <a:srcRect/>
-          <a:stretch>
-            <a:fillRect/>
-          </a:stretch>
-        </p:blipFill>
-        <p:spPr bwMode="auto">
-          <a:xfrm>
-            <a:off x="5644052" y="3783225"/>
-            <a:ext cx="924909" cy="1082071"/>
-          </a:xfrm>
-          <a:prstGeom prst="rect">
-            <a:avLst/>
-          </a:prstGeom>
-          <a:noFill/>
-          <a:extLst>
-            <a:ext uri="{909E8E84-426E-40DD-AFC4-6F175D3DCCD1}">
-              <a14:hiddenFill xmlns:a14="http://schemas.microsoft.com/office/drawing/2010/main">
-                <a:solidFill>
-                  <a:srgbClr val="FFFFFF"/>
-                </a:solidFill>
-              </a14:hiddenFill>
-            </a:ext>
-          </a:extLst>
-        </p:spPr>
-      </p:pic>
-      <p:pic>
-        <p:nvPicPr>
-          <p:cNvPr id="1030" name="Picture 6" descr="http://getfile9.posterous.com/getfile/files.posterous.com/temp-2010-06-17/tialljHdrkatAIavItaEkgAHFzGytbvcfvzEsBGckEIAcCqdjjHyjcgfldgy/browser-logo-major.png.scaled500.png"/>
-          <p:cNvPicPr>
-            <a:picLocks noChangeAspect="1" noChangeArrowheads="1"/>
-          </p:cNvPicPr>
-          <p:nvPr/>
-        </p:nvPicPr>
-        <p:blipFill>
-          <a:blip r:embed="rId6" cstate="email">
-            <a:extLst>
-              <a:ext uri="{28A0092B-C50C-407E-A947-70E740481C1C}">
-                <a14:useLocalDpi xmlns:a14="http://schemas.microsoft.com/office/drawing/2010/main" val="0"/>
-              </a:ext>
-            </a:extLst>
-          </a:blip>
-          <a:srcRect/>
-          <a:stretch>
-            <a:fillRect/>
-          </a:stretch>
-        </p:blipFill>
-        <p:spPr bwMode="auto">
-          <a:xfrm>
-            <a:off x="3501421" y="5331024"/>
-            <a:ext cx="1629388" cy="1162273"/>
-          </a:xfrm>
-          <a:prstGeom prst="rect">
-            <a:avLst/>
-          </a:prstGeom>
-          <a:noFill/>
-          <a:extLst>
-            <a:ext uri="{909E8E84-426E-40DD-AFC4-6F175D3DCCD1}">
-              <a14:hiddenFill xmlns:a14="http://schemas.microsoft.com/office/drawing/2010/main">
-                <a:solidFill>
-                  <a:srgbClr val="FFFFFF"/>
-                </a:solidFill>
-              </a14:hiddenFill>
-            </a:ext>
-          </a:extLst>
-        </p:spPr>
-      </p:pic>
-      <p:grpSp>
-        <p:nvGrpSpPr>
-          <p:cNvPr id="10" name="Gruppieren 9"/>
-          <p:cNvGrpSpPr/>
-          <p:nvPr/>
-        </p:nvGrpSpPr>
-        <p:grpSpPr>
-          <a:xfrm>
-            <a:off x="3376755" y="2440142"/>
-            <a:ext cx="1890981" cy="1124799"/>
-            <a:chOff x="3440998" y="4976579"/>
-            <a:chExt cx="1890981" cy="1124799"/>
-          </a:xfrm>
-        </p:grpSpPr>
-        <p:grpSp>
-          <p:nvGrpSpPr>
-            <p:cNvPr id="8" name="Gruppieren 7"/>
-            <p:cNvGrpSpPr/>
-            <p:nvPr/>
-          </p:nvGrpSpPr>
-          <p:grpSpPr>
-            <a:xfrm>
-              <a:off x="3440998" y="4976579"/>
-              <a:ext cx="1890981" cy="1124799"/>
-              <a:chOff x="3408938" y="5049426"/>
-              <a:chExt cx="1890981" cy="1124799"/>
-            </a:xfrm>
-          </p:grpSpPr>
-          <p:sp>
-            <p:nvSpPr>
-              <p:cNvPr id="6" name="Ellipse 5"/>
-              <p:cNvSpPr/>
-              <p:nvPr/>
-            </p:nvSpPr>
-            <p:spPr>
-              <a:xfrm>
-                <a:off x="3408938" y="5049426"/>
-                <a:ext cx="1800076" cy="1001969"/>
-              </a:xfrm>
-              <a:prstGeom prst="ellipse">
-                <a:avLst/>
-              </a:prstGeom>
-              <a:ln w="3175"/>
-            </p:spPr>
-            <p:style>
-              <a:lnRef idx="2">
-                <a:schemeClr val="accent5"/>
-              </a:lnRef>
-              <a:fillRef idx="1">
-                <a:schemeClr val="lt1"/>
-              </a:fillRef>
-              <a:effectRef idx="0">
-                <a:schemeClr val="accent5"/>
-              </a:effectRef>
-              <a:fontRef idx="minor">
-                <a:schemeClr val="dk1"/>
-              </a:fontRef>
-            </p:style>
-            <p:txBody>
-              <a:bodyPr rtlCol="0" anchor="ctr"/>
-              <a:lstStyle/>
-              <a:p>
-                <a:pPr algn="ctr"/>
-                <a:endParaRPr lang="de-DE" dirty="0"/>
-              </a:p>
-            </p:txBody>
-          </p:sp>
-          <p:pic>
-            <p:nvPicPr>
-              <p:cNvPr id="1036" name="Picture 12" descr="http://www.stealth-commando.de/images/news-pics/42_1305842338png"/>
-              <p:cNvPicPr>
-                <a:picLocks noChangeAspect="1" noChangeArrowheads="1"/>
-              </p:cNvPicPr>
-              <p:nvPr/>
-            </p:nvPicPr>
-            <p:blipFill>
-              <a:blip r:embed="rId7" cstate="email">
-                <a:extLst>
-                  <a:ext uri="{28A0092B-C50C-407E-A947-70E740481C1C}">
-                    <a14:useLocalDpi xmlns:a14="http://schemas.microsoft.com/office/drawing/2010/main" val="0"/>
-                  </a:ext>
-                </a:extLst>
-              </a:blip>
-              <a:srcRect/>
-              <a:stretch>
-                <a:fillRect/>
-              </a:stretch>
-            </p:blipFill>
-            <p:spPr bwMode="auto">
-              <a:xfrm>
-                <a:off x="4195949" y="5070255"/>
-                <a:ext cx="1103970" cy="1103970"/>
-              </a:xfrm>
-              <a:prstGeom prst="rect">
-                <a:avLst/>
-              </a:prstGeom>
-              <a:noFill/>
-              <a:extLst>
-                <a:ext uri="{909E8E84-426E-40DD-AFC4-6F175D3DCCD1}">
-                  <a14:hiddenFill xmlns:a14="http://schemas.microsoft.com/office/drawing/2010/main">
-                    <a:solidFill>
-                      <a:srgbClr val="FFFFFF"/>
-                    </a:solidFill>
-                  </a14:hiddenFill>
-                </a:ext>
-              </a:extLst>
-            </p:spPr>
-          </p:pic>
-          <p:pic>
-            <p:nvPicPr>
-              <p:cNvPr id="1042" name="Picture 18" descr="http://www.heredis.com/wp-content/themes/heredis/iphone/ios.png"/>
-              <p:cNvPicPr>
-                <a:picLocks noChangeAspect="1" noChangeArrowheads="1"/>
-              </p:cNvPicPr>
-              <p:nvPr/>
-            </p:nvPicPr>
-            <p:blipFill>
-              <a:blip r:embed="rId8" cstate="email">
-                <a:extLst>
-                  <a:ext uri="{28A0092B-C50C-407E-A947-70E740481C1C}">
-                    <a14:useLocalDpi xmlns:a14="http://schemas.microsoft.com/office/drawing/2010/main" val="0"/>
-                  </a:ext>
-                </a:extLst>
-              </a:blip>
-              <a:srcRect/>
-              <a:stretch>
-                <a:fillRect/>
-              </a:stretch>
-            </p:blipFill>
-            <p:spPr bwMode="auto">
-              <a:xfrm>
-                <a:off x="3619657" y="5392947"/>
-                <a:ext cx="812645" cy="551985"/>
-              </a:xfrm>
-              <a:prstGeom prst="rect">
-                <a:avLst/>
-              </a:prstGeom>
-              <a:noFill/>
-              <a:extLst>
-                <a:ext uri="{909E8E84-426E-40DD-AFC4-6F175D3DCCD1}">
-                  <a14:hiddenFill xmlns:a14="http://schemas.microsoft.com/office/drawing/2010/main">
-                    <a:solidFill>
-                      <a:srgbClr val="FFFFFF"/>
-                    </a:solidFill>
-                  </a14:hiddenFill>
-                </a:ext>
-              </a:extLst>
-            </p:spPr>
-          </p:pic>
-        </p:grpSp>
-        <p:sp>
-          <p:nvSpPr>
-            <p:cNvPr id="9" name="Textfeld 8"/>
-            <p:cNvSpPr txBox="1"/>
-            <p:nvPr/>
-          </p:nvSpPr>
-          <p:spPr>
-            <a:xfrm>
-              <a:off x="4240957" y="4977423"/>
-              <a:ext cx="248786" cy="369332"/>
-            </a:xfrm>
-            <a:prstGeom prst="rect">
-              <a:avLst/>
-            </a:prstGeom>
-            <a:noFill/>
-          </p:spPr>
-          <p:txBody>
-            <a:bodyPr wrap="none" rtlCol="0">
-              <a:spAutoFit/>
-            </a:bodyPr>
-            <a:lstStyle/>
-            <a:p>
-              <a:r>
-                <a:rPr lang="de-DE" dirty="0">
-                  <a:solidFill>
-                    <a:schemeClr val="tx2">
-                      <a:lumMod val="20000"/>
-                      <a:lumOff val="80000"/>
-                    </a:schemeClr>
-                  </a:solidFill>
-                  <a:effectLst>
-                    <a:outerShdw blurRad="38100" dist="38100" dir="2700000" algn="tl">
-                      <a:srgbClr val="000000">
-                        <a:alpha val="43137"/>
-                      </a:srgbClr>
-                    </a:outerShdw>
-                  </a:effectLst>
-                  <a:latin typeface="Helvetica" pitchFamily="34" charset="0"/>
-                </a:rPr>
-                <a:t>!</a:t>
-              </a:r>
-              <a:endParaRPr lang="de-DE" dirty="0">
-                <a:solidFill>
-                  <a:schemeClr val="tx2">
-                    <a:lumMod val="20000"/>
-                    <a:lumOff val="80000"/>
-                  </a:schemeClr>
-                </a:solidFill>
-                <a:effectLst>
-                  <a:outerShdw blurRad="38100" dist="38100" dir="2700000" algn="tl">
-                    <a:srgbClr val="000000">
-                      <a:alpha val="43137"/>
-                    </a:srgbClr>
-                  </a:outerShdw>
-                </a:effectLst>
-                <a:latin typeface="Helvetica" pitchFamily="34" charset="0"/>
-              </a:endParaRPr>
-            </a:p>
-          </p:txBody>
-        </p:sp>
-      </p:grpSp>
-      <p:pic>
-        <p:nvPicPr>
-          <p:cNvPr id="3" name="Grafik 2"/>
-          <p:cNvPicPr>
-            <a:picLocks noChangeAspect="1"/>
-          </p:cNvPicPr>
-          <p:nvPr/>
-        </p:nvPicPr>
-        <p:blipFill>
-          <a:blip r:embed="rId9" cstate="email">
-            <a:extLst>
-              <a:ext uri="{28A0092B-C50C-407E-A947-70E740481C1C}">
-                <a14:useLocalDpi xmlns:a14="http://schemas.microsoft.com/office/drawing/2010/main" val="0"/>
-              </a:ext>
-            </a:extLst>
-          </a:blip>
-          <a:stretch>
-            <a:fillRect/>
-          </a:stretch>
-        </p:blipFill>
-        <p:spPr>
-          <a:xfrm>
-            <a:off x="3915290" y="3917891"/>
-            <a:ext cx="801651" cy="947405"/>
-          </a:xfrm>
-          <a:prstGeom prst="rect">
-            <a:avLst/>
-          </a:prstGeom>
-        </p:spPr>
-      </p:pic>
     </p:spTree>
     <p:extLst>
       <p:ext uri="{BB962C8B-B14F-4D97-AF65-F5344CB8AC3E}">
-        <p14:creationId xmlns:p14="http://schemas.microsoft.com/office/powerpoint/2010/main" val="3872441007"/>
+        <p14:creationId xmlns:p14="http://schemas.microsoft.com/office/powerpoint/2010/main" val="1449198465"/>
       </p:ext>
     </p:extLst>
   </p:cSld>
   <p:clrMapOvr>
     <a:masterClrMapping/>
   </p:clrMapOvr>
-  <mc:AlternateContent xmlns:mc="http://schemas.openxmlformats.org/markup-compatibility/2006" xmlns:p14="http://schemas.microsoft.com/office/powerpoint/2010/main">
-    <mc:Choice Requires="p14">
-      <p:transition spd="slow" p14:dur="2000"/>
-    </mc:Choice>
-    <mc:Fallback xmlns="">
-      <p:transition spd="slow"/>
-    </mc:Fallback>
-  </mc:AlternateContent>
   <p:timing>
     <p:tnLst>
       <p:par>
-        <p:cTn id="1" dur="indefinite" restart="never" nodeType="tmRoot">
-          <p:childTnLst>
-            <p:seq concurrent="1" nextAc="seek">
-              <p:cTn id="2" dur="indefinite" nodeType="mainSeq">
-                <p:childTnLst>
-                  <p:par>
-                    <p:cTn id="3" fill="hold">
-                      <p:stCondLst>
-                        <p:cond delay="indefinite"/>
-                      </p:stCondLst>
-                      <p:childTnLst>
-                        <p:par>
-                          <p:cTn id="4" fill="hold">
-                            <p:stCondLst>
-                              <p:cond delay="0"/>
-                            </p:stCondLst>
-                            <p:childTnLst>
-                              <p:par>
-                                <p:cTn id="5" presetID="10" presetClass="entr" presetSubtype="0" fill="hold" nodeType="clickEffect">
-                                  <p:stCondLst>
-                                    <p:cond delay="0"/>
-                                  </p:stCondLst>
-                                  <p:childTnLst>
-                                    <p:set>
-                                      <p:cBhvr>
-                                        <p:cTn id="6" dur="1" fill="hold">
-                                          <p:stCondLst>
-                                            <p:cond delay="0"/>
-                                          </p:stCondLst>
-                                        </p:cTn>
-                                        <p:tgtEl>
-                                          <p:spTgt spid="1026"/>
-                                        </p:tgtEl>
-                                        <p:attrNameLst>
-                                          <p:attrName>style.visibility</p:attrName>
-                                        </p:attrNameLst>
-                                      </p:cBhvr>
-                                      <p:to>
-                                        <p:strVal val="visible"/>
-                                      </p:to>
-                                    </p:set>
-                                    <p:animEffect transition="in" filter="fade">
-                                      <p:cBhvr>
-                                        <p:cTn id="7" dur="500"/>
-                                        <p:tgtEl>
-                                          <p:spTgt spid="1026"/>
-                                        </p:tgtEl>
-                                      </p:cBhvr>
-                                    </p:animEffect>
-                                  </p:childTnLst>
-                                </p:cTn>
-                              </p:par>
-                              <p:par>
-                                <p:cTn id="8" presetID="10" presetClass="entr" presetSubtype="0" fill="hold" nodeType="withEffect">
-                                  <p:stCondLst>
-                                    <p:cond delay="0"/>
-                                  </p:stCondLst>
-                                  <p:childTnLst>
-                                    <p:set>
-                                      <p:cBhvr>
-                                        <p:cTn id="9" dur="1" fill="hold">
-                                          <p:stCondLst>
-                                            <p:cond delay="0"/>
-                                          </p:stCondLst>
-                                        </p:cTn>
-                                        <p:tgtEl>
-                                          <p:spTgt spid="3"/>
-                                        </p:tgtEl>
-                                        <p:attrNameLst>
-                                          <p:attrName>style.visibility</p:attrName>
-                                        </p:attrNameLst>
-                                      </p:cBhvr>
-                                      <p:to>
-                                        <p:strVal val="visible"/>
-                                      </p:to>
-                                    </p:set>
-                                    <p:animEffect transition="in" filter="fade">
-                                      <p:cBhvr>
-                                        <p:cTn id="10" dur="500"/>
-                                        <p:tgtEl>
-                                          <p:spTgt spid="3"/>
-                                        </p:tgtEl>
-                                      </p:cBhvr>
-                                    </p:animEffect>
-                                  </p:childTnLst>
-                                </p:cTn>
-                              </p:par>
-                              <p:par>
-                                <p:cTn id="11" presetID="10" presetClass="entr" presetSubtype="0" fill="hold" nodeType="withEffect">
-                                  <p:stCondLst>
-                                    <p:cond delay="0"/>
-                                  </p:stCondLst>
-                                  <p:childTnLst>
-                                    <p:set>
-                                      <p:cBhvr>
-                                        <p:cTn id="12" dur="1" fill="hold">
-                                          <p:stCondLst>
-                                            <p:cond delay="0"/>
-                                          </p:stCondLst>
-                                        </p:cTn>
-                                        <p:tgtEl>
-                                          <p:spTgt spid="1028"/>
-                                        </p:tgtEl>
-                                        <p:attrNameLst>
-                                          <p:attrName>style.visibility</p:attrName>
-                                        </p:attrNameLst>
-                                      </p:cBhvr>
-                                      <p:to>
-                                        <p:strVal val="visible"/>
-                                      </p:to>
-                                    </p:set>
-                                    <p:animEffect transition="in" filter="fade">
-                                      <p:cBhvr>
-                                        <p:cTn id="13" dur="500"/>
-                                        <p:tgtEl>
-                                          <p:spTgt spid="1028"/>
-                                        </p:tgtEl>
-                                      </p:cBhvr>
-                                    </p:animEffect>
-                                  </p:childTnLst>
-                                </p:cTn>
-                              </p:par>
-                            </p:childTnLst>
-                          </p:cTn>
-                        </p:par>
-                      </p:childTnLst>
-                    </p:cTn>
-                  </p:par>
-                  <p:par>
-                    <p:cTn id="14" fill="hold">
-                      <p:stCondLst>
-                        <p:cond delay="indefinite"/>
-                      </p:stCondLst>
-                      <p:childTnLst>
-                        <p:par>
-                          <p:cTn id="15" fill="hold">
-                            <p:stCondLst>
-                              <p:cond delay="0"/>
-                            </p:stCondLst>
-                            <p:childTnLst>
-                              <p:par>
-                                <p:cTn id="16" presetID="10" presetClass="entr" presetSubtype="0" fill="hold" nodeType="clickEffect">
-                                  <p:stCondLst>
-                                    <p:cond delay="0"/>
-                                  </p:stCondLst>
-                                  <p:childTnLst>
-                                    <p:set>
-                                      <p:cBhvr>
-                                        <p:cTn id="17" dur="1" fill="hold">
-                                          <p:stCondLst>
-                                            <p:cond delay="0"/>
-                                          </p:stCondLst>
-                                        </p:cTn>
-                                        <p:tgtEl>
-                                          <p:spTgt spid="1030"/>
-                                        </p:tgtEl>
-                                        <p:attrNameLst>
-                                          <p:attrName>style.visibility</p:attrName>
-                                        </p:attrNameLst>
-                                      </p:cBhvr>
-                                      <p:to>
-                                        <p:strVal val="visible"/>
-                                      </p:to>
-                                    </p:set>
-                                    <p:animEffect transition="in" filter="fade">
-                                      <p:cBhvr>
-                                        <p:cTn id="18" dur="500"/>
-                                        <p:tgtEl>
-                                          <p:spTgt spid="1030"/>
-                                        </p:tgtEl>
-                                      </p:cBhvr>
-                                    </p:animEffect>
-                                  </p:childTnLst>
-                                </p:cTn>
-                              </p:par>
-                            </p:childTnLst>
-                          </p:cTn>
-                        </p:par>
-                      </p:childTnLst>
-                    </p:cTn>
-                  </p:par>
-                  <p:par>
-                    <p:cTn id="19" fill="hold">
-                      <p:stCondLst>
-                        <p:cond delay="indefinite"/>
-                      </p:stCondLst>
-                      <p:childTnLst>
-                        <p:par>
-                          <p:cTn id="20" fill="hold">
-                            <p:stCondLst>
-                              <p:cond delay="0"/>
-                            </p:stCondLst>
-                            <p:childTnLst>
-                              <p:par>
-                                <p:cTn id="21" presetID="10" presetClass="entr" presetSubtype="0" fill="hold" nodeType="clickEffect">
-                                  <p:stCondLst>
-                                    <p:cond delay="0"/>
-                                  </p:stCondLst>
-                                  <p:childTnLst>
-                                    <p:set>
-                                      <p:cBhvr>
-                                        <p:cTn id="22" dur="1" fill="hold">
-                                          <p:stCondLst>
-                                            <p:cond delay="0"/>
-                                          </p:stCondLst>
-                                        </p:cTn>
-                                        <p:tgtEl>
-                                          <p:spTgt spid="10"/>
-                                        </p:tgtEl>
-                                        <p:attrNameLst>
-                                          <p:attrName>style.visibility</p:attrName>
-                                        </p:attrNameLst>
-                                      </p:cBhvr>
-                                      <p:to>
-                                        <p:strVal val="visible"/>
-                                      </p:to>
-                                    </p:set>
-                                    <p:animEffect transition="in" filter="fade">
-                                      <p:cBhvr>
-                                        <p:cTn id="23" dur="500"/>
-                                        <p:tgtEl>
-                                          <p:spTgt spid="10"/>
-                                        </p:tgtEl>
-                                      </p:cBhvr>
-                                    </p:animEffect>
-                                  </p:childTnLst>
-                                </p:cTn>
-                              </p:par>
-                            </p:childTnLst>
-                          </p:cTn>
-                        </p:par>
-                      </p:childTnLst>
-                    </p:cTn>
-                  </p:par>
-                  <p:par>
-                    <p:cTn id="24" fill="hold">
-                      <p:stCondLst>
-                        <p:cond delay="indefinite"/>
-                      </p:stCondLst>
-                      <p:childTnLst>
-                        <p:par>
-                          <p:cTn id="25" fill="hold">
-                            <p:stCondLst>
-                              <p:cond delay="0"/>
-                            </p:stCondLst>
-                            <p:childTnLst>
-                              <p:par>
-                                <p:cTn id="26" presetID="10" presetClass="entr" presetSubtype="0" fill="hold" nodeType="clickEffect">
-                                  <p:stCondLst>
-                                    <p:cond delay="0"/>
-                                  </p:stCondLst>
-                                  <p:childTnLst>
-                                    <p:set>
-                                      <p:cBhvr>
-                                        <p:cTn id="27" dur="1" fill="hold">
-                                          <p:stCondLst>
-                                            <p:cond delay="0"/>
-                                          </p:stCondLst>
-                                        </p:cTn>
-                                        <p:tgtEl>
-                                          <p:spTgt spid="5"/>
-                                        </p:tgtEl>
-                                        <p:attrNameLst>
-                                          <p:attrName>style.visibility</p:attrName>
-                                        </p:attrNameLst>
-                                      </p:cBhvr>
-                                      <p:to>
-                                        <p:strVal val="visible"/>
-                                      </p:to>
-                                    </p:set>
-                                    <p:animEffect transition="in" filter="fade">
-                                      <p:cBhvr>
-                                        <p:cTn id="28" dur="500"/>
-                                        <p:tgtEl>
-                                          <p:spTgt spid="5"/>
-                                        </p:tgtEl>
-                                      </p:cBhvr>
-                                    </p:animEffect>
-                                  </p:childTnLst>
-                                </p:cTn>
-                              </p:par>
-                            </p:childTnLst>
-                          </p:cTn>
-                        </p:par>
-                      </p:childTnLst>
-                    </p:cTn>
-                  </p:par>
-                </p:childTnLst>
-              </p:cTn>
-              <p:prevCondLst>
-                <p:cond evt="onPrev" delay="0">
-                  <p:tgtEl>
-                    <p:sldTgt/>
-                  </p:tgtEl>
-                </p:cond>
-              </p:prevCondLst>
-              <p:nextCondLst>
-                <p:cond evt="onNext" delay="0">
-                  <p:tgtEl>
-                    <p:sldTgt/>
-                  </p:tgtEl>
-                </p:cond>
-              </p:nextCondLst>
-            </p:seq>
-          </p:childTnLst>
-        </p:cTn>
+        <p:cTn id="1" dur="indefinite" restart="never" nodeType="tmRoot"/>
       </p:par>
     </p:tnLst>
   </p:timing>

</xml_diff>